<commit_message>
minor updates to workshop material
</commit_message>
<xml_diff>
--- a/workshop.pptx
+++ b/workshop.pptx
@@ -24,6 +24,8 @@
     <p:sldId id="272" r:id="rId18"/>
     <p:sldId id="273" r:id="rId19"/>
     <p:sldId id="274" r:id="rId20"/>
+    <p:sldId id="275" r:id="rId21"/>
+    <p:sldId id="276" r:id="rId22"/>
   </p:sldIdLst>
   <p:sldSz cx="9144000" cy="5143500" type="screen16x9"/>
   <p:notesSz cx="6858000" cy="9144000"/>
@@ -3346,7 +3348,7 @@
             </a:pPr>
             <a:r>
               <a:rPr/>
-              <a:t>Say Hi and Version It - Step By Step</a:t>
+              <a:t>Say Hi and Version It - Step 1</a:t>
             </a:r>
           </a:p>
         </p:txBody>
@@ -3486,7 +3488,7 @@
               <a:rPr>
                 <a:latin typeface="Courier"/>
               </a:rPr>
-              <a:t>&lt;urn:uuid:...&gt; &lt;http://purl.org/pav/hasVersion&gt; &lt;hash://md5/75c7e31591354f2c82226aa3eb0267c7&gt; &lt;urn:uuid:...&gt; .</a:t>
+              <a:t>&lt;...&gt; &lt;...hasVersion&gt; &lt;hash://md5/75c7e31591354f2c82226aa3eb0267c7&gt; &lt;...&gt; .</a:t>
             </a:r>
           </a:p>
           <a:p>
@@ -3599,44 +3601,7 @@
               <a:rPr>
                 <a:latin typeface="Courier"/>
               </a:rPr>
-              <a:t>&lt;urn:uuid:X&gt; &lt;http://purl.org/pav/hasVersion&gt; &lt;hash://md5/75c7e31591354f2c82226aa3eb0267c7&gt; &lt;urn:uuid:...&gt; .</a:t>
-            </a:r>
-          </a:p>
-          <a:p>
-            <a:pPr lvl="0" indent="0" marL="0">
-              <a:buNone/>
-            </a:pPr>
-            <a:r>
-              <a:rPr/>
-              <a:t>This is a statement expressed in rdf/nquad. In this case, it expressed something like: there’s this thing </a:t>
-            </a:r>
-            <a:r>
-              <a:rPr>
-                <a:latin typeface="Courier"/>
-              </a:rPr>
-              <a:t>urn:uuid:X</a:t>
-            </a:r>
-            <a:r>
-              <a:rPr/>
-              <a:t> that is associated with content that has a cryptographic hash </a:t>
-            </a:r>
-            <a:r>
-              <a:rPr>
-                <a:latin typeface="Courier"/>
-              </a:rPr>
-              <a:t>hash://md5/75c7e31591354f2c82226aa3eb0267c7</a:t>
-            </a:r>
-            <a:r>
-              <a:rPr/>
-              <a:t>. A cryptographic hash is a unique fingerprint derived from the digital content itself. </a:t>
-            </a:r>
-            <a:r>
-              <a:rPr b="1"/>
-              <a:t>If the content and the hash algorithm are the same, the fingerprint is always the same.</a:t>
-            </a:r>
-            <a:r>
-              <a:rPr/>
-              <a:t> This concept is central to internet security as well as things like cryptocurrencies.</a:t>
+              <a:t>&lt;urn:uuid:X&gt; &lt;...hasVersion&gt; &lt;hash://md5/75c7e31591354f2c82226aa3eb0267c7&gt; .</a:t>
             </a:r>
           </a:p>
         </p:txBody>
@@ -3703,15 +3668,6 @@
           <a:bodyPr/>
           <a:lstStyle/>
           <a:p>
-            <a:pPr lvl="0" indent="0" marL="0">
-              <a:buNone/>
-            </a:pPr>
-            <a:r>
-              <a:rPr/>
-              <a:t>Now, we ask Preston to print the versioned content by piping the “hasVersion” statement into ``preston cat```:</a:t>
-            </a:r>
-          </a:p>
-          <a:p>
             <a:pPr lvl="0" indent="0">
               <a:buNone/>
             </a:pPr>
@@ -3719,7 +3675,7 @@
               <a:rPr>
                 <a:latin typeface="Courier"/>
               </a:rPr>
-              <a:t>echo hi there! | preston track --algo md5 | grep hasVersion | preston cat</a:t>
+              <a:t>&lt;urn:uuid:X&gt; &lt;...hasVersion&gt; &lt;hash://md5/75c7e31591354f2c82226aa3eb0267c7&gt; ...</a:t>
             </a:r>
           </a:p>
           <a:p>
@@ -3728,18 +3684,35 @@
             </a:pPr>
             <a:r>
               <a:rPr/>
-              <a:t>to produce . . .</a:t>
-            </a:r>
-          </a:p>
-          <a:p>
-            <a:pPr lvl="0" indent="0">
-              <a:buNone/>
-            </a:pPr>
+              <a:t>This is a statement expressed in rdf/nquad. In this case, it expressed something like: there’s this thing </a:t>
+            </a:r>
             <a:r>
               <a:rPr>
                 <a:latin typeface="Courier"/>
               </a:rPr>
-              <a:t>hi there!</a:t>
+              <a:t>urn:uuid:X</a:t>
+            </a:r>
+            <a:r>
+              <a:rPr/>
+              <a:t> that is associated with content that has a cryptographic hash </a:t>
+            </a:r>
+            <a:r>
+              <a:rPr>
+                <a:latin typeface="Courier"/>
+              </a:rPr>
+              <a:t>hash://md5/75c7e31591354f2c82226aa3eb0267c7</a:t>
+            </a:r>
+            <a:r>
+              <a:rPr/>
+              <a:t>. A cryptographic hash is a unique fingerprint derived from the digital content itself. </a:t>
+            </a:r>
+            <a:r>
+              <a:rPr b="1"/>
+              <a:t>If the content and the hash algorithm are the same, the fingerprint is always the same.</a:t>
+            </a:r>
+            <a:r>
+              <a:rPr/>
+              <a:t> This concept is central to internet security as well as things like cryptocurrencies.</a:t>
             </a:r>
           </a:p>
         </p:txBody>
@@ -3811,7 +3784,7 @@
             </a:pPr>
             <a:r>
               <a:rPr/>
-              <a:t>Now that we’ve versioned saying hi, we can print the content using</a:t>
+              <a:t>Now, we ask Preston to print the versioned content by piping the “hasVersion” statement into ``preston cat```:</a:t>
             </a:r>
           </a:p>
           <a:p>
@@ -3822,7 +3795,7 @@
               <a:rPr>
                 <a:latin typeface="Courier"/>
               </a:rPr>
-              <a:t>preston cat hash://md5/75c7e31591354f2c82226aa3eb0267c7</a:t>
+              <a:t>echo hi there! | preston track --algo md5 | grep hasVersion | preston cat</a:t>
             </a:r>
           </a:p>
           <a:p>
@@ -3831,7 +3804,7 @@
             </a:pPr>
             <a:r>
               <a:rPr/>
-              <a:t>to produce …</a:t>
+              <a:t>to produce . . .</a:t>
             </a:r>
           </a:p>
           <a:p>
@@ -3843,43 +3816,6 @@
                 <a:latin typeface="Courier"/>
               </a:rPr>
               <a:t>hi there!</a:t>
-            </a:r>
-          </a:p>
-          <a:p>
-            <a:pPr lvl="0" indent="0" marL="0">
-              <a:buNone/>
-            </a:pPr>
-            <a:r>
-              <a:rPr/>
-              <a:t>This suggests that Preston </a:t>
-            </a:r>
-            <a:r>
-              <a:rPr i="1"/>
-              <a:t>thinks</a:t>
-            </a:r>
-            <a:r>
-              <a:rPr/>
-              <a:t> that </a:t>
-            </a:r>
-            <a:r>
-              <a:rPr>
-                <a:latin typeface="Courier"/>
-              </a:rPr>
-              <a:t>hash://md5/75c7e31591354f2c82226aa3eb0267c7</a:t>
-            </a:r>
-            <a:r>
-              <a:rPr/>
-              <a:t> is the cryptographic hash of </a:t>
-            </a:r>
-            <a:r>
-              <a:rPr>
-                <a:latin typeface="Courier"/>
-              </a:rPr>
-              <a:t>hi there!</a:t>
-            </a:r>
-            <a:r>
-              <a:rPr/>
-              <a:t>. And . . .</a:t>
             </a:r>
           </a:p>
         </p:txBody>
@@ -3951,7 +3887,55 @@
             </a:pPr>
             <a:r>
               <a:rPr/>
-              <a:t>If you know the fingerprint of content (e.g., </a:t>
+              <a:t>Now that we’ve versioned saying hi, we can print the content using</a:t>
+            </a:r>
+          </a:p>
+          <a:p>
+            <a:pPr lvl="0" indent="0">
+              <a:buNone/>
+            </a:pPr>
+            <a:r>
+              <a:rPr>
+                <a:latin typeface="Courier"/>
+              </a:rPr>
+              <a:t>preston cat hash://md5/75c7e31591354f2c82226aa3eb0267c7</a:t>
+            </a:r>
+          </a:p>
+          <a:p>
+            <a:pPr lvl="0" indent="0" marL="0">
+              <a:buNone/>
+            </a:pPr>
+            <a:r>
+              <a:rPr/>
+              <a:t>to produce …</a:t>
+            </a:r>
+          </a:p>
+          <a:p>
+            <a:pPr lvl="0" indent="0">
+              <a:buNone/>
+            </a:pPr>
+            <a:r>
+              <a:rPr>
+                <a:latin typeface="Courier"/>
+              </a:rPr>
+              <a:t>hi there!</a:t>
+            </a:r>
+          </a:p>
+          <a:p>
+            <a:pPr lvl="0" indent="0" marL="0">
+              <a:buNone/>
+            </a:pPr>
+            <a:r>
+              <a:rPr/>
+              <a:t>This suggests that Preston </a:t>
+            </a:r>
+            <a:r>
+              <a:rPr i="1"/>
+              <a:t>thinks</a:t>
+            </a:r>
+            <a:r>
+              <a:rPr/>
+              <a:t> that </a:t>
             </a:r>
             <a:r>
               <a:rPr>
@@ -3961,93 +3945,17 @@
             </a:r>
             <a:r>
               <a:rPr/>
-              <a:t>), you can use it to ask for what </a:t>
-            </a:r>
-            <a:r>
-              <a:rPr i="1"/>
-              <a:t>exactly</a:t>
-            </a:r>
-            <a:r>
-              <a:rPr/>
-              <a:t> what you want. And, on getting a result, you can </a:t>
-            </a:r>
-            <a:r>
-              <a:rPr i="1"/>
-              <a:t>independently</a:t>
-            </a:r>
-            <a:r>
-              <a:rPr/>
-              <a:t> verify that this is the case using some commonly available cryptographic hash calculators like </a:t>
+              <a:t> is the cryptographic hash of </a:t>
             </a:r>
             <a:r>
               <a:rPr>
                 <a:latin typeface="Courier"/>
               </a:rPr>
-              <a:t>md5sum</a:t>
-            </a:r>
-            <a:r>
-              <a:rPr/>
-              <a:t> (linux) or </a:t>
-            </a:r>
-            <a:r>
-              <a:rPr>
-                <a:latin typeface="Courier"/>
-              </a:rPr>
-              <a:t>md5</a:t>
-            </a:r>
-            <a:r>
-              <a:rPr/>
-              <a:t> (Mac). These calculators are readily available as they are central to internet security and other core applications.</a:t>
-            </a:r>
-          </a:p>
-          <a:p>
-            <a:pPr lvl="0" indent="0">
-              <a:buNone/>
-            </a:pPr>
-            <a:r>
-              <a:rPr>
-                <a:latin typeface="Courier"/>
-              </a:rPr>
-              <a:t>preston cat hash://md5/75c7e31591354f2c82226aa3eb0267c7 | md5sum</a:t>
-            </a:r>
-          </a:p>
-          <a:p>
-            <a:pPr lvl="0" indent="0" marL="0">
-              <a:buNone/>
-            </a:pPr>
-            <a:r>
-              <a:rPr/>
-              <a:t>produces:</a:t>
-            </a:r>
-          </a:p>
-          <a:p>
-            <a:pPr lvl="0" indent="0">
-              <a:buNone/>
-            </a:pPr>
-            <a:r>
-              <a:rPr>
-                <a:latin typeface="Courier"/>
-              </a:rPr>
-              <a:t>75c7e31591354f2c82226aa3eb0267c7  -</a:t>
-            </a:r>
-          </a:p>
-          <a:p>
-            <a:pPr lvl="0" indent="0" marL="0">
-              <a:buNone/>
-            </a:pPr>
-            <a:r>
-              <a:rPr/>
-              <a:t>Showing that an independent tool </a:t>
-            </a:r>
-            <a:r>
-              <a:rPr>
-                <a:latin typeface="Courier"/>
-              </a:rPr>
-              <a:t>md5sum</a:t>
-            </a:r>
-            <a:r>
-              <a:rPr/>
-              <a:t> verified that the content you asked for is the content you got!</a:t>
+              <a:t>hi there!</a:t>
+            </a:r>
+            <a:r>
+              <a:rPr/>
+              <a:t>. And . . .</a:t>
             </a:r>
           </a:p>
         </p:txBody>
@@ -4094,7 +4002,7 @@
             </a:pPr>
             <a:r>
               <a:rPr/>
-              <a:t>Take Aways</a:t>
+              <a:t>Say Hi and Version It - Step 7</a:t>
             </a:r>
           </a:p>
         </p:txBody>
@@ -4114,31 +4022,58 @@
           <a:bodyPr/>
           <a:lstStyle/>
           <a:p>
-            <a:pPr lvl="0"/>
-            <a:r>
-              <a:rPr/>
-              <a:t>Preston tracks, versions and packages digital content</a:t>
-            </a:r>
-          </a:p>
-          <a:p>
-            <a:pPr lvl="0"/>
-            <a:r>
-              <a:rPr/>
-              <a:t>Cryptographic hashes are unique digital fingerprints for digital content.</a:t>
-            </a:r>
-          </a:p>
-          <a:p>
-            <a:pPr lvl="0"/>
-            <a:r>
-              <a:rPr/>
-              <a:t>Cryptographic hashes can be generated independently using commonly available tools.</a:t>
-            </a:r>
-          </a:p>
-          <a:p>
-            <a:pPr lvl="0"/>
-            <a:r>
-              <a:rPr/>
-              <a:t>Cryptographic hashes enable secure citation of digital content</a:t>
+            <a:pPr lvl="0" indent="0" marL="0">
+              <a:buNone/>
+            </a:pPr>
+            <a:r>
+              <a:rPr/>
+              <a:t>If you know the fingerprint of content (e.g., </a:t>
+            </a:r>
+            <a:r>
+              <a:rPr>
+                <a:latin typeface="Courier"/>
+              </a:rPr>
+              <a:t>hash://md5/75c7e31591354f2c82226aa3eb0267c7</a:t>
+            </a:r>
+            <a:r>
+              <a:rPr/>
+              <a:t>), you can use it to ask for what </a:t>
+            </a:r>
+            <a:r>
+              <a:rPr i="1"/>
+              <a:t>exactly</a:t>
+            </a:r>
+            <a:r>
+              <a:rPr/>
+              <a:t> what you want. And, on getting a result, you can </a:t>
+            </a:r>
+            <a:r>
+              <a:rPr i="1"/>
+              <a:t>independently</a:t>
+            </a:r>
+            <a:r>
+              <a:rPr/>
+              <a:t> verify that this is the case using some commonly available cryptographic hash calculators like </a:t>
+            </a:r>
+            <a:r>
+              <a:rPr>
+                <a:latin typeface="Courier"/>
+              </a:rPr>
+              <a:t>md5sum</a:t>
+            </a:r>
+            <a:r>
+              <a:rPr/>
+              <a:t> (linux) or </a:t>
+            </a:r>
+            <a:r>
+              <a:rPr>
+                <a:latin typeface="Courier"/>
+              </a:rPr>
+              <a:t>md5</a:t>
+            </a:r>
+            <a:r>
+              <a:rPr/>
+              <a:t> (Mac). These calculators are readily available as they are central to internet security and other core applications.</a:t>
             </a:r>
           </a:p>
         </p:txBody>
@@ -4185,7 +4120,7 @@
             </a:pPr>
             <a:r>
               <a:rPr/>
-              <a:t>Next Steps</a:t>
+              <a:t>Say Hi and Version It - Step 7 Continued…</a:t>
             </a:r>
           </a:p>
         </p:txBody>
@@ -4205,45 +4140,53 @@
           <a:bodyPr/>
           <a:lstStyle/>
           <a:p>
-            <a:pPr lvl="0"/>
-            <a:r>
-              <a:rPr/>
-              <a:t>Review BatLit Datapaper</a:t>
-            </a:r>
-          </a:p>
-          <a:p>
-            <a:pPr lvl="0"/>
-            <a:r>
-              <a:rPr/>
-              <a:t>Create a Zotero Group for Testing</a:t>
-            </a:r>
-          </a:p>
-          <a:p>
-            <a:pPr lvl="0"/>
-            <a:r>
-              <a:rPr/>
-              <a:t>Track the Zotero Test Group using Preston</a:t>
-            </a:r>
-          </a:p>
-          <a:p>
-            <a:pPr lvl="0"/>
-            <a:r>
-              <a:rPr/>
-              <a:t>Create a Zenodo Test Community on Zenodo Sandbox</a:t>
-            </a:r>
-          </a:p>
-          <a:p>
-            <a:pPr lvl="0"/>
-            <a:r>
-              <a:rPr/>
-              <a:t>Publish the Zotero Test Group to the Zenodo Test Community</a:t>
-            </a:r>
-          </a:p>
-          <a:p>
-            <a:pPr lvl="0"/>
-            <a:r>
-              <a:rPr/>
-              <a:t>Once you feel comfortable, repeat the process with the “real” Zotero BatLit Group and associated Zenodo BatLit Community</a:t>
+            <a:pPr lvl="0" indent="0">
+              <a:buNone/>
+            </a:pPr>
+            <a:r>
+              <a:rPr>
+                <a:latin typeface="Courier"/>
+              </a:rPr>
+              <a:t>preston cat hash://md5/75c7e31591354f2c82226aa3eb0267c7 | md5sum</a:t>
+            </a:r>
+          </a:p>
+          <a:p>
+            <a:pPr lvl="0" indent="0" marL="0">
+              <a:buNone/>
+            </a:pPr>
+            <a:r>
+              <a:rPr/>
+              <a:t>produces:</a:t>
+            </a:r>
+          </a:p>
+          <a:p>
+            <a:pPr lvl="0" indent="0">
+              <a:buNone/>
+            </a:pPr>
+            <a:r>
+              <a:rPr>
+                <a:latin typeface="Courier"/>
+              </a:rPr>
+              <a:t>75c7e31591354f2c82226aa3eb0267c7  -</a:t>
+            </a:r>
+          </a:p>
+          <a:p>
+            <a:pPr lvl="0" indent="0" marL="0">
+              <a:buNone/>
+            </a:pPr>
+            <a:r>
+              <a:rPr/>
+              <a:t>Showing that an independent tool </a:t>
+            </a:r>
+            <a:r>
+              <a:rPr>
+                <a:latin typeface="Courier"/>
+              </a:rPr>
+              <a:t>md5sum</a:t>
+            </a:r>
+            <a:r>
+              <a:rPr/>
+              <a:t> verified that the content you asked for is the content you got!</a:t>
             </a:r>
           </a:p>
         </p:txBody>
@@ -4290,7 +4233,7 @@
             </a:pPr>
             <a:r>
               <a:rPr/>
-              <a:t>Notes</a:t>
+              <a:t>Takeaways</a:t>
             </a:r>
           </a:p>
         </p:txBody>
@@ -4310,35 +4253,31 @@
           <a:bodyPr/>
           <a:lstStyle/>
           <a:p>
-            <a:pPr lvl="0" indent="0" marL="0">
-              <a:buNone/>
-            </a:pPr>
-            <a:r>
-              <a:rPr sz="1800"/>
-              <a:t>1. Elliott M.J., Poelen, J.H. &amp; Fortes, J.A.B. (2023) Signing data citations enables data verification and citation persistence. </a:t>
-            </a:r>
-            <a:r>
-              <a:rPr sz="1800" i="1"/>
-              <a:t>Sci Data</a:t>
-            </a:r>
-            <a:r>
-              <a:rPr sz="1800"/>
-              <a:t>. https://doi.org/10.1038/s41597-023-02230-y </a:t>
-            </a:r>
-            <a:r>
-              <a:rPr sz="1800">
-                <a:hlinkClick r:id="rId2"/>
-              </a:rPr>
-              <a:t>hash://sha256/f849c870565f608899f183ca261365dce9c9f1c5441b1c779e0db49df9c2a19d</a:t>
-            </a:r>
-          </a:p>
-          <a:p>
-            <a:pPr lvl="0" indent="0" marL="0">
-              <a:buNone/>
-            </a:pPr>
-            <a:r>
-              <a:rPr sz="1800"/>
-              <a:t>2. https://globalbioticinteractions.org/preston</a:t>
+            <a:pPr lvl="0"/>
+            <a:r>
+              <a:rPr/>
+              <a:t>Preston tracks, versions and packages digital content</a:t>
+            </a:r>
+          </a:p>
+          <a:p>
+            <a:pPr lvl="0"/>
+            <a:r>
+              <a:rPr/>
+              <a:t>Cryptographic hashes are unique digital fingerprints for digital content.</a:t>
+            </a:r>
+          </a:p>
+          <a:p>
+            <a:pPr lvl="0"/>
+            <a:r>
+              <a:rPr/>
+              <a:t>Cryptographic hashes can be generated independently using commonly available tools.</a:t>
+            </a:r>
+          </a:p>
+          <a:p>
+            <a:pPr lvl="0"/>
+            <a:r>
+              <a:rPr/>
+              <a:t>Cryptographic hashes enable secure citation of digital content</a:t>
             </a:r>
           </a:p>
         </p:txBody>
@@ -4447,6 +4386,206 @@
 </p:sld>
 </file>
 
+<file path=ppt/slides/slide20.xml><?xml version="1.0" encoding="utf-8"?>
+<p:sld xmlns:a="http://schemas.openxmlformats.org/drawingml/2006/main" xmlns:r="http://schemas.openxmlformats.org/officeDocument/2006/relationships" xmlns:p="http://schemas.openxmlformats.org/presentationml/2006/main">
+  <p:cSld>
+    <p:spTree>
+      <p:nvGrpSpPr>
+        <p:cNvPr id="1" name=""/>
+        <p:cNvGrpSpPr/>
+        <p:nvPr/>
+      </p:nvGrpSpPr>
+      <p:grpSpPr>
+        <a:xfrm>
+          <a:off x="0" y="0"/>
+          <a:ext cx="0" cy="0"/>
+          <a:chOff x="0" y="0"/>
+          <a:chExt cx="0" cy="0"/>
+        </a:xfrm>
+      </p:grpSpPr>
+      <p:sp>
+        <p:nvSpPr>
+          <p:cNvPr id="2" name="Title 1"/>
+          <p:cNvSpPr>
+            <a:spLocks noGrp="1"/>
+          </p:cNvSpPr>
+          <p:nvPr>
+            <p:ph type="title"/>
+          </p:nvPr>
+        </p:nvSpPr>
+        <p:spPr/>
+        <p:txBody>
+          <a:bodyPr/>
+          <a:lstStyle/>
+          <a:p>
+            <a:pPr lvl="0" indent="0" marL="0">
+              <a:buNone/>
+            </a:pPr>
+            <a:r>
+              <a:rPr/>
+              <a:t>Next Steps</a:t>
+            </a:r>
+          </a:p>
+        </p:txBody>
+      </p:sp>
+      <p:sp>
+        <p:nvSpPr>
+          <p:cNvPr id="3" name="Content Placeholder 2"/>
+          <p:cNvSpPr>
+            <a:spLocks noGrp="1"/>
+          </p:cNvSpPr>
+          <p:nvPr>
+            <p:ph idx="1"/>
+          </p:nvPr>
+        </p:nvSpPr>
+        <p:spPr/>
+        <p:txBody>
+          <a:bodyPr/>
+          <a:lstStyle/>
+          <a:p>
+            <a:pPr lvl="0"/>
+            <a:r>
+              <a:rPr/>
+              <a:t>Review BatLit Datapaper</a:t>
+            </a:r>
+          </a:p>
+          <a:p>
+            <a:pPr lvl="0"/>
+            <a:r>
+              <a:rPr/>
+              <a:t>Create a Zotero Group for Testing</a:t>
+            </a:r>
+          </a:p>
+          <a:p>
+            <a:pPr lvl="0"/>
+            <a:r>
+              <a:rPr/>
+              <a:t>Track the Zotero Test Group using Preston</a:t>
+            </a:r>
+          </a:p>
+          <a:p>
+            <a:pPr lvl="0"/>
+            <a:r>
+              <a:rPr/>
+              <a:t>Create a Zenodo Test Community on Zenodo Sandbox</a:t>
+            </a:r>
+          </a:p>
+          <a:p>
+            <a:pPr lvl="0"/>
+            <a:r>
+              <a:rPr/>
+              <a:t>Publish the Zotero Test Group to the Zenodo Test Community</a:t>
+            </a:r>
+          </a:p>
+          <a:p>
+            <a:pPr lvl="0"/>
+            <a:r>
+              <a:rPr/>
+              <a:t>Once you feel comfortable, repeat the process with the “real” Zotero BatLit Group and associated Zenodo BatLit Community</a:t>
+            </a:r>
+          </a:p>
+        </p:txBody>
+      </p:sp>
+    </p:spTree>
+  </p:cSld>
+</p:sld>
+</file>
+
+<file path=ppt/slides/slide21.xml><?xml version="1.0" encoding="utf-8"?>
+<p:sld xmlns:a="http://schemas.openxmlformats.org/drawingml/2006/main" xmlns:r="http://schemas.openxmlformats.org/officeDocument/2006/relationships" xmlns:p="http://schemas.openxmlformats.org/presentationml/2006/main">
+  <p:cSld>
+    <p:spTree>
+      <p:nvGrpSpPr>
+        <p:cNvPr id="1" name=""/>
+        <p:cNvGrpSpPr/>
+        <p:nvPr/>
+      </p:nvGrpSpPr>
+      <p:grpSpPr>
+        <a:xfrm>
+          <a:off x="0" y="0"/>
+          <a:ext cx="0" cy="0"/>
+          <a:chOff x="0" y="0"/>
+          <a:chExt cx="0" cy="0"/>
+        </a:xfrm>
+      </p:grpSpPr>
+      <p:sp>
+        <p:nvSpPr>
+          <p:cNvPr id="2" name="Title 1"/>
+          <p:cNvSpPr>
+            <a:spLocks noGrp="1"/>
+          </p:cNvSpPr>
+          <p:nvPr>
+            <p:ph type="title"/>
+          </p:nvPr>
+        </p:nvSpPr>
+        <p:spPr/>
+        <p:txBody>
+          <a:bodyPr/>
+          <a:lstStyle/>
+          <a:p>
+            <a:pPr lvl="0" indent="0" marL="0">
+              <a:buNone/>
+            </a:pPr>
+            <a:r>
+              <a:rPr/>
+              <a:t>Notes</a:t>
+            </a:r>
+          </a:p>
+        </p:txBody>
+      </p:sp>
+      <p:sp>
+        <p:nvSpPr>
+          <p:cNvPr id="3" name="Content Placeholder 2"/>
+          <p:cNvSpPr>
+            <a:spLocks noGrp="1"/>
+          </p:cNvSpPr>
+          <p:nvPr>
+            <p:ph idx="1"/>
+          </p:nvPr>
+        </p:nvSpPr>
+        <p:spPr/>
+        <p:txBody>
+          <a:bodyPr/>
+          <a:lstStyle/>
+          <a:p>
+            <a:pPr lvl="0" indent="0" marL="0">
+              <a:buNone/>
+            </a:pPr>
+            <a:r>
+              <a:rPr sz="1800"/>
+              <a:t>1. Elliott M.J., Poelen, J.H. &amp; Fortes, J.A.B. (2023) Signing data citations enables data verification and citation persistence. </a:t>
+            </a:r>
+            <a:r>
+              <a:rPr sz="1800" i="1"/>
+              <a:t>Sci Data</a:t>
+            </a:r>
+            <a:r>
+              <a:rPr sz="1800"/>
+              <a:t>. https://doi.org/10.1038/s41597-023-02230-y </a:t>
+            </a:r>
+            <a:r>
+              <a:rPr sz="1800">
+                <a:hlinkClick r:id="rId2"/>
+              </a:rPr>
+              <a:t>hash://sha256/f849c870565f608899f183ca261365dce9c9f1c5441b1c779e0db49df9c2a19d</a:t>
+            </a:r>
+          </a:p>
+          <a:p>
+            <a:pPr lvl="0" indent="0" marL="0">
+              <a:buNone/>
+            </a:pPr>
+            <a:r>
+              <a:rPr sz="1800"/>
+              <a:t>2. https://globalbioticinteractions.org/preston</a:t>
+            </a:r>
+          </a:p>
+        </p:txBody>
+      </p:sp>
+    </p:spTree>
+  </p:cSld>
+</p:sld>
+</file>
+
 <file path=ppt/slides/slide3.xml><?xml version="1.0" encoding="utf-8"?>
 <p:sld xmlns:a="http://schemas.openxmlformats.org/drawingml/2006/main" xmlns:r="http://schemas.openxmlformats.org/officeDocument/2006/relationships" xmlns:p="http://schemas.openxmlformats.org/presentationml/2006/main">
   <p:cSld>
@@ -4740,7 +4879,7 @@
             </a:pPr>
             <a:r>
               <a:rPr/>
-              <a:t>Guiding Questions - More Complete Answers</a:t>
+              <a:t>BatLit Publication Workflow</a:t>
             </a:r>
           </a:p>
         </p:txBody>
@@ -4761,8 +4900,8 @@
         </p:blipFill>
         <p:spPr bwMode="auto">
           <a:xfrm>
-            <a:off x="2082800" y="1193800"/>
-            <a:ext cx="4978400" cy="2882900"/>
+            <a:off x="1651000" y="1193800"/>
+            <a:ext cx="5854700" cy="3390900"/>
           </a:xfrm>
           <a:prstGeom prst="rect">
             <a:avLst/>
@@ -4775,36 +4914,6 @@
           </a:ln>
         </p:spPr>
       </p:pic>
-      <p:sp>
-        <p:nvSpPr>
-          <p:cNvPr id="1" name="TextBox 3"/>
-          <p:cNvSpPr txBox="1"/>
-          <p:nvPr/>
-        </p:nvSpPr>
-        <p:spPr>
-          <a:xfrm>
-            <a:off x="457200" y="4076700"/>
-            <a:ext cx="8229600" cy="508000"/>
-          </a:xfrm>
-          <a:prstGeom prst="rect">
-            <a:avLst/>
-          </a:prstGeom>
-          <a:noFill/>
-        </p:spPr>
-        <p:txBody>
-          <a:bodyPr/>
-          <a:lstStyle/>
-          <a:p>
-            <a:pPr lvl="0" indent="0" marL="0" algn="ctr">
-              <a:buNone/>
-            </a:pPr>
-            <a:r>
-              <a:rPr/>
-              <a:t>a visual representation of the batlit publication workflow</a:t>
-            </a:r>
-          </a:p>
-        </p:txBody>
-      </p:sp>
     </p:spTree>
   </p:cSld>
 </p:sld>
@@ -4872,7 +4981,25 @@
             </a:pPr>
             <a:r>
               <a:rPr/>
-              <a:t>Preston allows for creating a versioned snapshot of a Zotero library (or group). Also, Preston allows for depositing this versioned snapshot into Zenodo. At time of writing, 26 Aug 2025, this unique functionality only offered through Preston.</a:t>
+              <a:t>Preston allows for creating a versioned snapshot of a Zotero library (or group).</a:t>
+            </a:r>
+          </a:p>
+          <a:p>
+            <a:pPr lvl="0" indent="0" marL="0">
+              <a:buNone/>
+            </a:pPr>
+            <a:r>
+              <a:rPr/>
+              <a:t>Also, Preston allows for depositing this versioned snapshot into Zenodo.</a:t>
+            </a:r>
+          </a:p>
+          <a:p>
+            <a:pPr lvl="0" indent="0" marL="0">
+              <a:buNone/>
+            </a:pPr>
+            <a:r>
+              <a:rPr/>
+              <a:t>At time of writing, 26 Aug 2025, this publish Zotero-to-Zenodo functionality only offered through Preston.</a:t>
             </a:r>
           </a:p>
         </p:txBody>
@@ -4969,7 +5096,7 @@
             </a:r>
             <a:r>
               <a:rPr/>
-              <a:t> digital content)</a:t>
+              <a:t> Digital Content)</a:t>
             </a:r>
           </a:p>
           <a:p>

</xml_diff>

<commit_message>
add explicit whitespaces to avoid trimming in code blocks; fyi @ajacsherman
</commit_message>
<xml_diff>
--- a/workshop.pptx
+++ b/workshop.pptx
@@ -6244,8 +6244,8 @@
               <a:t>mkdir logs
 cat zenodo.json\
  | preston track --algo md5 --data-dir logs/data\
- | preston zenodo --algo md5 --data-dir logs/data\
- --remote file://$PWD/data/\
+ | preston zenodo --algo md5 --data-dir logs/data \
+ --remote file://$PWD/data/ \
  --community "[your community id]"\
  &gt; deposit.log</a:t>
             </a:r>

</xml_diff>

<commit_message>
apply workshop step changes
</commit_message>
<xml_diff>
--- a/workshop.pptx
+++ b/workshop.pptx
@@ -4981,7 +4981,7 @@
             </a:pPr>
             <a:r>
               <a:rPr/>
-              <a:t>Step II.4 Make a change and create a new snapshot</a:t>
+              <a:t>Step II.3.1 A sorted list of metadata for most recent Bill of Materials</a:t>
             </a:r>
           </a:p>
         </p:txBody>
@@ -5001,21 +5001,20 @@
           <a:bodyPr/>
           <a:lstStyle/>
           <a:p>
-            <a:pPr lvl="0" indent="-342900" marL="342900">
-              <a:buAutoNum type="arabicPeriod"/>
-            </a:pPr>
-            <a:r>
-              <a:rPr/>
-              <a:t>Change the title of one of the publication in your test Zotero Group</a:t>
-            </a:r>
-          </a:p>
-          <a:p>
-            <a:pPr lvl="0" indent="-342900" marL="342900">
-              <a:buAutoNum type="arabicPeriod"/>
-            </a:pPr>
-            <a:r>
-              <a:rPr/>
-              <a:t>Make a new snapshot version by re-running:</a:t>
+            <a:pPr lvl="0" indent="0" marL="0">
+              <a:buNone/>
+            </a:pPr>
+            <a:r>
+              <a:rPr/>
+              <a:t>Create a sorted list metadata statement from the Zotero group for the </a:t>
+            </a:r>
+            <a:r>
+              <a:rPr i="1"/>
+              <a:t>most recent</a:t>
+            </a:r>
+            <a:r>
+              <a:rPr/>
+              <a:t> Bill of Materials, and list their content</a:t>
             </a:r>
           </a:p>
           <a:p>
@@ -5026,7 +5025,14 @@
               <a:rPr>
                 <a:latin typeface="Courier"/>
               </a:rPr>
-              <a:t>preston track --algo md5 [Zotero Group from URL]</a:t>
+              <a:t>preston head --algo md5\
+ | preston cat\
+ | grep hasVersion\
+ | grep "https://api.zotero.org/groups/[Zotero group number]/items/"\ 
+ | grep -v "file/view"\
+ | sort\
+ | preston cat\
+ &gt; metadata-before-change.txt</a:t>
             </a:r>
           </a:p>
         </p:txBody>
@@ -5073,7 +5079,7 @@
             </a:pPr>
             <a:r>
               <a:rPr/>
-              <a:t>Step II.5 Compare changes in metadata across snapshot versions</a:t>
+              <a:t>Step II.4 Make a change and create a new snapshot</a:t>
             </a:r>
           </a:p>
         </p:txBody>
@@ -5093,21 +5099,32 @@
           <a:bodyPr/>
           <a:lstStyle/>
           <a:p>
-            <a:pPr lvl="0" indent="0" marL="0">
-              <a:buNone/>
-            </a:pPr>
-            <a:r>
-              <a:rPr/>
-              <a:t>After making a change in a Zotero records, and creating a new snapshot, we can compare the different versions of Bill of Materials associated with these snapshots.</a:t>
-            </a:r>
-          </a:p>
-          <a:p>
-            <a:pPr lvl="0" indent="0" marL="0">
-              <a:buNone/>
-            </a:pPr>
-            <a:r>
-              <a:rPr/>
-              <a:t>In order to do so, we need to (II.5.1) make a sorted list of all metadata for the most recent Bill of Materials and (II.5.2) make a sorted list of all metadata of a previous Bill of Materials. Finally, (II.5.3) we compare the differences between these metadata snapshots.</a:t>
+            <a:pPr lvl="0" indent="-342900" marL="342900">
+              <a:buAutoNum type="arabicPeriod"/>
+            </a:pPr>
+            <a:r>
+              <a:rPr/>
+              <a:t>Change the title of one of the publication in your test Zotero Group</a:t>
+            </a:r>
+          </a:p>
+          <a:p>
+            <a:pPr lvl="0" indent="-342900" marL="342900">
+              <a:buAutoNum type="arabicPeriod"/>
+            </a:pPr>
+            <a:r>
+              <a:rPr/>
+              <a:t>Make a new snapshot version by re-running:</a:t>
+            </a:r>
+          </a:p>
+          <a:p>
+            <a:pPr lvl="0" indent="0">
+              <a:buNone/>
+            </a:pPr>
+            <a:r>
+              <a:rPr>
+                <a:latin typeface="Courier"/>
+              </a:rPr>
+              <a:t>preston track --algo md5 [Zotero Group from URL]</a:t>
             </a:r>
           </a:p>
         </p:txBody>
@@ -5154,7 +5171,7 @@
             </a:pPr>
             <a:r>
               <a:rPr/>
-              <a:t>Step II.5.1 A sorted list of metadata for most recent Bill of Materials</a:t>
+              <a:t>Step II.4.1 A sorted list of metadata for newly updated Bill of Materials</a:t>
             </a:r>
           </a:p>
         </p:txBody>
@@ -5179,15 +5196,7 @@
             </a:pPr>
             <a:r>
               <a:rPr/>
-              <a:t>Create a sorted list metadata statement from the Zotero group for the </a:t>
-            </a:r>
-            <a:r>
-              <a:rPr i="1"/>
-              <a:t>most recent</a:t>
-            </a:r>
-            <a:r>
-              <a:rPr/>
-              <a:t> Bill of Materials, and list their content</a:t>
+              <a:t>Create a sorted list metadata statement from the Zotero group for the newly updated Bill of Materials, and list their content</a:t>
             </a:r>
           </a:p>
           <a:p>
@@ -5205,26 +5214,7 @@
  | grep -v "file/view"\
  | sort\
  | preston cat\
- &gt; most-recent-metadata.txt</a:t>
-            </a:r>
-          </a:p>
-          <a:p>
-            <a:pPr lvl="0" indent="0" marL="0">
-              <a:buNone/>
-            </a:pPr>
-            <a:r>
-              <a:rPr/>
-              <a:t>where </a:t>
-            </a:r>
-            <a:r>
-              <a:rPr>
-                <a:latin typeface="Courier"/>
-              </a:rPr>
-              <a:t>[Zotero group number]</a:t>
-            </a:r>
-            <a:r>
-              <a:rPr/>
-              <a:t> is the group id number of your Zotero Test Group. An example of a Zotero number is: 6151809 .</a:t>
+ &gt; metadata-after-change.txt</a:t>
             </a:r>
           </a:p>
         </p:txBody>
@@ -5271,7 +5261,7 @@
             </a:pPr>
             <a:r>
               <a:rPr/>
-              <a:t>Step II.5.2 A sorted list of metadata for a previous version of the Bill of Materials</a:t>
+              <a:t>Step II.5 Compare changes in metadata across snapshot versions</a:t>
             </a:r>
           </a:p>
         </p:txBody>
@@ -5296,53 +5286,25 @@
             </a:pPr>
             <a:r>
               <a:rPr/>
-              <a:t>List all the content of the metadata from the Zotero group for the </a:t>
-            </a:r>
-            <a:r>
-              <a:rPr i="1"/>
-              <a:t>oldest</a:t>
-            </a:r>
-            <a:r>
-              <a:rPr/>
-              <a:t> Bill of Materials and print it to a file</a:t>
-            </a:r>
-          </a:p>
-          <a:p>
-            <a:pPr lvl="0" indent="0">
-              <a:buNone/>
-            </a:pPr>
-            <a:r>
-              <a:rPr>
-                <a:latin typeface="Courier"/>
-              </a:rPr>
-              <a:t>preston history --algo md5\
- | tail -1\
- | preston cat\
- |  grep hasVersion\
- | grep "https://api.zotero.org/groups/[Zotero group number]/items/"\
- | grep -v "file/view"\
- | sort\
- | preston cat\
- &gt; oldest-metadata.txt</a:t>
-            </a:r>
-          </a:p>
-          <a:p>
-            <a:pPr lvl="0" indent="0" marL="0">
-              <a:buNone/>
-            </a:pPr>
-            <a:r>
-              <a:rPr/>
-              <a:t>where </a:t>
-            </a:r>
-            <a:r>
-              <a:rPr>
-                <a:latin typeface="Courier"/>
-              </a:rPr>
-              <a:t>[Zotero group number]</a:t>
-            </a:r>
-            <a:r>
-              <a:rPr/>
-              <a:t> is the group id number of your Zotero Test Group. An example of a Zotero number is: 6151809 .</a:t>
+              <a:t>After making a change in a Zotero records, and creating a new snapshot, we can compare the different versions of Bill of Materials associated with these snapshots.</a:t>
+            </a:r>
+          </a:p>
+          <a:p>
+            <a:pPr lvl="0" indent="0" marL="0">
+              <a:buNone/>
+            </a:pPr>
+            <a:r>
+              <a:rPr/>
+              <a:t>In order to do so, we compare (II.3.1) the sorted list of all metadata for associated with an initial Bill of Materials and (II.4.1) a sorted list of all metadata associated with a Bill of Materials after a change.</a:t>
+            </a:r>
+          </a:p>
+          <a:p>
+            <a:pPr lvl="0" indent="0" marL="0">
+              <a:buNone/>
+            </a:pPr>
+            <a:r>
+              <a:rPr/>
+              <a:t>Next, (II.5.1) we compare the differences between these metadata snapshots.</a:t>
             </a:r>
           </a:p>
         </p:txBody>
@@ -5389,7 +5351,7 @@
             </a:pPr>
             <a:r>
               <a:rPr/>
-              <a:t>Step II.5.3 Compare changes across metadata associated with two versions of Bill of Materials</a:t>
+              <a:t>Step II.5.1 Compare changes across metadata associated with two versions of Bill of Materials</a:t>
             </a:r>
           </a:p>
         </p:txBody>
@@ -5435,16 +5397,16 @@
               <a:rPr>
                 <a:latin typeface="Courier"/>
               </a:rPr>
-              <a:t> diff most-recent-metadata.txt oldest-metadata.txt</a:t>
-            </a:r>
-          </a:p>
-          <a:p>
-            <a:pPr lvl="0" indent="0" marL="0">
-              <a:buNone/>
-            </a:pPr>
-            <a:r>
-              <a:rPr/>
-              <a:t>to produce</a:t>
+              <a:t> diff metadata-before-change.txt metadata-after-change.txt</a:t>
+            </a:r>
+          </a:p>
+          <a:p>
+            <a:pPr lvl="0" indent="0" marL="0">
+              <a:buNone/>
+            </a:pPr>
+            <a:r>
+              <a:rPr/>
+              <a:t>to produce a result like</a:t>
             </a:r>
           </a:p>
           <a:p>

</xml_diff>

<commit_message>
update workshop material after discussion with @ajacsherman
</commit_message>
<xml_diff>
--- a/workshop.pptx
+++ b/workshop.pptx
@@ -41,6 +41,10 @@
     <p:sldId id="289" r:id="rId35"/>
     <p:sldId id="290" r:id="rId36"/>
     <p:sldId id="291" r:id="rId37"/>
+    <p:sldId id="292" r:id="rId38"/>
+    <p:sldId id="293" r:id="rId39"/>
+    <p:sldId id="294" r:id="rId40"/>
+    <p:sldId id="295" r:id="rId41"/>
   </p:sldIdLst>
   <p:sldSz cx="9144000" cy="5143500" type="screen16x9"/>
   <p:notesSz cx="6858000" cy="9144000"/>
@@ -3216,7 +3220,7 @@
             </a:pPr>
             <a:r>
               <a:rPr/>
-              <a:t>2025-08-26/2025-08-29</a:t>
+              <a:t>2025-08-26/2025-09-17</a:t>
             </a:r>
           </a:p>
         </p:txBody>
@@ -6256,7 +6260,7 @@
             </a:pPr>
             <a:r>
               <a:rPr/>
-              <a:t>Notes</a:t>
+              <a:t>Part IV - Maintenance</a:t>
             </a:r>
           </a:p>
         </p:txBody>
@@ -6280,31 +6284,392 @@
               <a:buNone/>
             </a:pPr>
             <a:r>
-              <a:rPr sz="1800"/>
-              <a:t>1. Elliott M.J., Poelen, J.H. &amp; Fortes, J.A.B. (2023) Signing data citations enables data verification and citation persistence. </a:t>
-            </a:r>
-            <a:r>
-              <a:rPr sz="1800" i="1"/>
-              <a:t>Sci Data</a:t>
-            </a:r>
-            <a:r>
-              <a:rPr sz="1800"/>
-              <a:t>. https://doi.org/10.1038/s41597-023-02230-y </a:t>
-            </a:r>
-            <a:r>
-              <a:rPr sz="1800">
-                <a:hlinkClick r:id="rId2"/>
+              <a:rPr/>
+              <a:t>After initial deposit, metadata in Zotero records may be updated. Also, PDFs associated with a Zotero record may be exchanged with a different one (e.g., an incorrect pdf was associated with some literature record).</a:t>
+            </a:r>
+          </a:p>
+          <a:p>
+            <a:pPr lvl="0" indent="0" marL="0">
+              <a:buNone/>
+            </a:pPr>
+            <a:r>
+              <a:rPr/>
+              <a:t>To update metadata of a Zenodo deposit associated with a Zotero record, you can re-run Step III.4 after including either </a:t>
+            </a:r>
+            <a:r>
+              <a:rPr>
+                <a:latin typeface="Courier"/>
               </a:rPr>
-              <a:t>hash://sha256/f849c870565f608899f183ca261365dce9c9f1c5441b1c779e0db49df9c2a19d</a:t>
-            </a:r>
-          </a:p>
-          <a:p>
-            <a:pPr lvl="0" indent="0" marL="0">
-              <a:buNone/>
-            </a:pPr>
-            <a:r>
-              <a:rPr sz="1800"/>
-              <a:t>2. https://globalbioticinteractions.org/preston</a:t>
+              <a:t>--update-metadata-only</a:t>
+            </a:r>
+            <a:r>
+              <a:rPr/>
+              <a:t> or </a:t>
+            </a:r>
+            <a:r>
+              <a:rPr>
+                <a:latin typeface="Courier"/>
+              </a:rPr>
+              <a:t>--new-version</a:t>
+            </a:r>
+            <a:r>
+              <a:rPr/>
+              <a:t>.</a:t>
+            </a:r>
+          </a:p>
+          <a:p>
+            <a:pPr lvl="0" indent="0" marL="0">
+              <a:buNone/>
+            </a:pPr>
+            <a:r>
+              <a:rPr/>
+              <a:t>With </a:t>
+            </a:r>
+            <a:r>
+              <a:rPr>
+                <a:latin typeface="Courier"/>
+              </a:rPr>
+              <a:t>--update-metadata-only</a:t>
+            </a:r>
+            <a:r>
+              <a:rPr/>
+              <a:t> an metadata of an existing Zenodo record is updated with the Zotero record metadata. No new version is created and the pdf attachment is left untouched.</a:t>
+            </a:r>
+          </a:p>
+          <a:p>
+            <a:pPr lvl="0" indent="0" marL="0">
+              <a:buNone/>
+            </a:pPr>
+            <a:r>
+              <a:rPr/>
+              <a:t>With </a:t>
+            </a:r>
+            <a:r>
+              <a:rPr>
+                <a:latin typeface="Courier"/>
+              </a:rPr>
+              <a:t>--new-version</a:t>
+            </a:r>
+            <a:r>
+              <a:rPr/>
+              <a:t> a new version of an existing Zenodo record is deposited with updated the Zotero record metadata and the associated pdf in Zotero.</a:t>
+            </a:r>
+          </a:p>
+          <a:p>
+            <a:pPr lvl="0" indent="0" marL="0">
+              <a:buNone/>
+            </a:pPr>
+            <a:r>
+              <a:rPr/>
+              <a:t>Note that Zenodo record metadata is editable, however Zenodo record files are </a:t>
+            </a:r>
+            <a:r>
+              <a:rPr i="1"/>
+              <a:t>not</a:t>
+            </a:r>
+            <a:r>
+              <a:rPr/>
+              <a:t>.</a:t>
+            </a:r>
+          </a:p>
+          <a:p>
+            <a:pPr lvl="0" indent="0" marL="0">
+              <a:buNone/>
+            </a:pPr>
+            <a:r>
+              <a:rPr/>
+              <a:t>So, when you need to update a pdf associated with a Zotero record, you need to create a </a:t>
+            </a:r>
+            <a:r>
+              <a:rPr>
+                <a:latin typeface="Courier"/>
+              </a:rPr>
+              <a:t>--new-version</a:t>
+            </a:r>
+            <a:r>
+              <a:rPr/>
+              <a:t>. This is </a:t>
+            </a:r>
+            <a:r>
+              <a:rPr i="1"/>
+              <a:t>not</a:t>
+            </a:r>
+            <a:r>
+              <a:rPr/>
+              <a:t> done by default.</a:t>
+            </a:r>
+          </a:p>
+          <a:p>
+            <a:pPr lvl="0" indent="0" marL="0">
+              <a:buNone/>
+            </a:pPr>
+            <a:r>
+              <a:rPr/>
+              <a:t>Default behavior is to not update the associated Zenodo record and skip the deposit.</a:t>
+            </a:r>
+          </a:p>
+        </p:txBody>
+      </p:sp>
+    </p:spTree>
+  </p:cSld>
+</p:sld>
+</file>
+
+<file path=ppt/slides/slide37.xml><?xml version="1.0" encoding="utf-8"?>
+<p:sld xmlns:a="http://schemas.openxmlformats.org/drawingml/2006/main" xmlns:r="http://schemas.openxmlformats.org/officeDocument/2006/relationships" xmlns:p="http://schemas.openxmlformats.org/presentationml/2006/main">
+  <p:cSld>
+    <p:spTree>
+      <p:nvGrpSpPr>
+        <p:cNvPr id="1" name=""/>
+        <p:cNvGrpSpPr/>
+        <p:nvPr/>
+      </p:nvGrpSpPr>
+      <p:grpSpPr>
+        <a:xfrm>
+          <a:off x="0" y="0"/>
+          <a:ext cx="0" cy="0"/>
+          <a:chOff x="0" y="0"/>
+          <a:chExt cx="0" cy="0"/>
+        </a:xfrm>
+      </p:grpSpPr>
+      <p:sp>
+        <p:nvSpPr>
+          <p:cNvPr id="2" name="Title 1"/>
+          <p:cNvSpPr>
+            <a:spLocks noGrp="1"/>
+          </p:cNvSpPr>
+          <p:nvPr>
+            <p:ph type="title"/>
+          </p:nvPr>
+        </p:nvSpPr>
+        <p:spPr/>
+        <p:txBody>
+          <a:bodyPr/>
+          <a:lstStyle/>
+          <a:p>
+            <a:pPr lvl="0" indent="0" marL="0">
+              <a:buNone/>
+            </a:pPr>
+            <a:r>
+              <a:rPr/>
+              <a:t>Part IV.1 - Edit Existing Record and Update Metadata</a:t>
+            </a:r>
+          </a:p>
+        </p:txBody>
+      </p:sp>
+      <p:sp>
+        <p:nvSpPr>
+          <p:cNvPr id="3" name="Content Placeholder 2"/>
+          <p:cNvSpPr>
+            <a:spLocks noGrp="1"/>
+          </p:cNvSpPr>
+          <p:nvPr>
+            <p:ph idx="1"/>
+          </p:nvPr>
+        </p:nvSpPr>
+        <p:spPr/>
+        <p:txBody>
+          <a:bodyPr/>
+          <a:lstStyle/>
+          <a:p>
+            <a:pPr lvl="0" indent="-342900" marL="342900">
+              <a:buAutoNum type="arabicPeriod"/>
+            </a:pPr>
+            <a:r>
+              <a:rPr/>
+              <a:t>Update metadata for an already deposited Zotero record.</a:t>
+            </a:r>
+          </a:p>
+          <a:p>
+            <a:pPr lvl="0" indent="-342900" marL="342900">
+              <a:buAutoNum type="arabicPeriod"/>
+            </a:pPr>
+            <a:r>
+              <a:rPr/>
+              <a:t>Run the deposit workflow with the </a:t>
+            </a:r>
+            <a:r>
+              <a:rPr>
+                <a:latin typeface="Courier"/>
+              </a:rPr>
+              <a:t>--update-metadata-only</a:t>
+            </a:r>
+          </a:p>
+          <a:p>
+            <a:pPr lvl="0" indent="-342900" marL="342900">
+              <a:buAutoNum type="arabicPeriod"/>
+            </a:pPr>
+            <a:r>
+              <a:rPr/>
+              <a:t>Verify that the metadata of record in Zenodo was updated, but no new version was created.</a:t>
+            </a:r>
+          </a:p>
+        </p:txBody>
+      </p:sp>
+    </p:spTree>
+  </p:cSld>
+</p:sld>
+</file>
+
+<file path=ppt/slides/slide38.xml><?xml version="1.0" encoding="utf-8"?>
+<p:sld xmlns:a="http://schemas.openxmlformats.org/drawingml/2006/main" xmlns:r="http://schemas.openxmlformats.org/officeDocument/2006/relationships" xmlns:p="http://schemas.openxmlformats.org/presentationml/2006/main">
+  <p:cSld>
+    <p:spTree>
+      <p:nvGrpSpPr>
+        <p:cNvPr id="1" name=""/>
+        <p:cNvGrpSpPr/>
+        <p:nvPr/>
+      </p:nvGrpSpPr>
+      <p:grpSpPr>
+        <a:xfrm>
+          <a:off x="0" y="0"/>
+          <a:ext cx="0" cy="0"/>
+          <a:chOff x="0" y="0"/>
+          <a:chExt cx="0" cy="0"/>
+        </a:xfrm>
+      </p:grpSpPr>
+      <p:sp>
+        <p:nvSpPr>
+          <p:cNvPr id="2" name="Title 1"/>
+          <p:cNvSpPr>
+            <a:spLocks noGrp="1"/>
+          </p:cNvSpPr>
+          <p:nvPr>
+            <p:ph type="title"/>
+          </p:nvPr>
+        </p:nvSpPr>
+        <p:spPr/>
+        <p:txBody>
+          <a:bodyPr/>
+          <a:lstStyle/>
+          <a:p>
+            <a:pPr lvl="0" indent="0" marL="0">
+              <a:buNone/>
+            </a:pPr>
+            <a:r>
+              <a:rPr/>
+              <a:t>Part IV.2 - Create New Record with Updated PDF and Metadata</a:t>
+            </a:r>
+          </a:p>
+        </p:txBody>
+      </p:sp>
+      <p:sp>
+        <p:nvSpPr>
+          <p:cNvPr id="3" name="Content Placeholder 2"/>
+          <p:cNvSpPr>
+            <a:spLocks noGrp="1"/>
+          </p:cNvSpPr>
+          <p:nvPr>
+            <p:ph idx="1"/>
+          </p:nvPr>
+        </p:nvSpPr>
+        <p:spPr/>
+        <p:txBody>
+          <a:bodyPr/>
+          <a:lstStyle/>
+          <a:p>
+            <a:pPr lvl="0" indent="-342900" marL="342900">
+              <a:buAutoNum type="arabicPeriod"/>
+            </a:pPr>
+            <a:r>
+              <a:rPr/>
+              <a:t>Replace a pdf attachment for an already deposited Zotero record.</a:t>
+            </a:r>
+          </a:p>
+          <a:p>
+            <a:pPr lvl="0" indent="-342900" marL="342900">
+              <a:buAutoNum type="arabicPeriod"/>
+            </a:pPr>
+            <a:r>
+              <a:rPr/>
+              <a:t>Run the deposit workflow with the </a:t>
+            </a:r>
+            <a:r>
+              <a:rPr>
+                <a:latin typeface="Courier"/>
+              </a:rPr>
+              <a:t>--new-version</a:t>
+            </a:r>
+          </a:p>
+          <a:p>
+            <a:pPr lvl="0" indent="-342900" marL="342900">
+              <a:buAutoNum type="arabicPeriod"/>
+            </a:pPr>
+            <a:r>
+              <a:rPr/>
+              <a:t>Verify that a new version was created for the Zenodo record including the updated pdf</a:t>
+            </a:r>
+          </a:p>
+        </p:txBody>
+      </p:sp>
+    </p:spTree>
+  </p:cSld>
+</p:sld>
+</file>
+
+<file path=ppt/slides/slide39.xml><?xml version="1.0" encoding="utf-8"?>
+<p:sld xmlns:a="http://schemas.openxmlformats.org/drawingml/2006/main" xmlns:r="http://schemas.openxmlformats.org/officeDocument/2006/relationships" xmlns:p="http://schemas.openxmlformats.org/presentationml/2006/main">
+  <p:cSld>
+    <p:spTree>
+      <p:nvGrpSpPr>
+        <p:cNvPr id="1" name=""/>
+        <p:cNvGrpSpPr/>
+        <p:nvPr/>
+      </p:nvGrpSpPr>
+      <p:grpSpPr>
+        <a:xfrm>
+          <a:off x="0" y="0"/>
+          <a:ext cx="0" cy="0"/>
+          <a:chOff x="0" y="0"/>
+          <a:chExt cx="0" cy="0"/>
+        </a:xfrm>
+      </p:grpSpPr>
+      <p:sp>
+        <p:nvSpPr>
+          <p:cNvPr id="2" name="Title 1"/>
+          <p:cNvSpPr>
+            <a:spLocks noGrp="1"/>
+          </p:cNvSpPr>
+          <p:nvPr>
+            <p:ph type="title"/>
+          </p:nvPr>
+        </p:nvSpPr>
+        <p:spPr/>
+        <p:txBody>
+          <a:bodyPr/>
+          <a:lstStyle/>
+          <a:p>
+            <a:pPr lvl="0" indent="0" marL="0">
+              <a:buNone/>
+            </a:pPr>
+            <a:r>
+              <a:rPr/>
+              <a:t>Part IV.3 - Retire Zenodo Deposit Associated with Deleted Zotero Record</a:t>
+            </a:r>
+          </a:p>
+        </p:txBody>
+      </p:sp>
+      <p:sp>
+        <p:nvSpPr>
+          <p:cNvPr id="3" name="Content Placeholder 2"/>
+          <p:cNvSpPr>
+            <a:spLocks noGrp="1"/>
+          </p:cNvSpPr>
+          <p:nvPr>
+            <p:ph idx="1"/>
+          </p:nvPr>
+        </p:nvSpPr>
+        <p:spPr/>
+        <p:txBody>
+          <a:bodyPr/>
+          <a:lstStyle/>
+          <a:p>
+            <a:pPr lvl="0" indent="0" marL="0">
+              <a:buNone/>
+            </a:pPr>
+            <a:r>
+              <a:rPr/>
+              <a:t>(for now, manual workflow, can be automated if needed) 1. Locate the Zenodo Deposit Associated with a Zotero record that no longer exists 2. Click on Community :gear: icon “submit to community” in lower right panel 3. Submit to the “batlit-retired” community 4. Click on “manage communities” 5. If present, remove the deposit from the BatLit and BLR communities</a:t>
             </a:r>
           </a:p>
         </p:txBody>
@@ -6405,6 +6770,101 @@
             <a:r>
               <a:rPr/>
               <a:t>The following sections help you get started on Preston and their relation to Zotero and Zenodo.</a:t>
+            </a:r>
+          </a:p>
+        </p:txBody>
+      </p:sp>
+    </p:spTree>
+  </p:cSld>
+</p:sld>
+</file>
+
+<file path=ppt/slides/slide40.xml><?xml version="1.0" encoding="utf-8"?>
+<p:sld xmlns:a="http://schemas.openxmlformats.org/drawingml/2006/main" xmlns:r="http://schemas.openxmlformats.org/officeDocument/2006/relationships" xmlns:p="http://schemas.openxmlformats.org/presentationml/2006/main">
+  <p:cSld>
+    <p:spTree>
+      <p:nvGrpSpPr>
+        <p:cNvPr id="1" name=""/>
+        <p:cNvGrpSpPr/>
+        <p:nvPr/>
+      </p:nvGrpSpPr>
+      <p:grpSpPr>
+        <a:xfrm>
+          <a:off x="0" y="0"/>
+          <a:ext cx="0" cy="0"/>
+          <a:chOff x="0" y="0"/>
+          <a:chExt cx="0" cy="0"/>
+        </a:xfrm>
+      </p:grpSpPr>
+      <p:sp>
+        <p:nvSpPr>
+          <p:cNvPr id="2" name="Title 1"/>
+          <p:cNvSpPr>
+            <a:spLocks noGrp="1"/>
+          </p:cNvSpPr>
+          <p:nvPr>
+            <p:ph type="title"/>
+          </p:nvPr>
+        </p:nvSpPr>
+        <p:spPr/>
+        <p:txBody>
+          <a:bodyPr/>
+          <a:lstStyle/>
+          <a:p>
+            <a:pPr lvl="0" indent="0" marL="0">
+              <a:buNone/>
+            </a:pPr>
+            <a:r>
+              <a:rPr/>
+              <a:t>Notes</a:t>
+            </a:r>
+          </a:p>
+        </p:txBody>
+      </p:sp>
+      <p:sp>
+        <p:nvSpPr>
+          <p:cNvPr id="3" name="Content Placeholder 2"/>
+          <p:cNvSpPr>
+            <a:spLocks noGrp="1"/>
+          </p:cNvSpPr>
+          <p:nvPr>
+            <p:ph idx="1"/>
+          </p:nvPr>
+        </p:nvSpPr>
+        <p:spPr/>
+        <p:txBody>
+          <a:bodyPr/>
+          <a:lstStyle/>
+          <a:p>
+            <a:pPr lvl="0" indent="0" marL="0">
+              <a:buNone/>
+            </a:pPr>
+            <a:r>
+              <a:rPr sz="1800"/>
+              <a:t>1. Elliott M.J., Poelen, J.H. &amp; Fortes, J.A.B. (2023) Signing data citations enables data verification and citation persistence. </a:t>
+            </a:r>
+            <a:r>
+              <a:rPr sz="1800" i="1"/>
+              <a:t>Sci Data</a:t>
+            </a:r>
+            <a:r>
+              <a:rPr sz="1800"/>
+              <a:t>. https://doi.org/10.1038/s41597-023-02230-y </a:t>
+            </a:r>
+            <a:r>
+              <a:rPr sz="1800">
+                <a:hlinkClick r:id="rId2"/>
+              </a:rPr>
+              <a:t>hash://sha256/f849c870565f608899f183ca261365dce9c9f1c5441b1c779e0db49df9c2a19d</a:t>
+            </a:r>
+          </a:p>
+          <a:p>
+            <a:pPr lvl="0" indent="0" marL="0">
+              <a:buNone/>
+            </a:pPr>
+            <a:r>
+              <a:rPr sz="1800"/>
+              <a:t>2. https://globalbioticinteractions.org/preston</a:t>
             </a:r>
           </a:p>
         </p:txBody>

</xml_diff>

<commit_message>
add recreated workshop assets
</commit_message>
<xml_diff>
--- a/workshop.pptx
+++ b/workshop.pptx
@@ -4938,7 +4938,26 @@
                 <a:latin typeface="Courier"/>
               </a:rPr>
               <a:t>export ZOTERO_TOKEN=[SECRET]
-preston track --algo md5 [Zotero Group from URL]</a:t>
+preston track --algo md5 [Zotero Group URL]</a:t>
+            </a:r>
+          </a:p>
+          <a:p>
+            <a:pPr lvl="0" indent="0" marL="0">
+              <a:buNone/>
+            </a:pPr>
+            <a:r>
+              <a:rPr/>
+              <a:t>(Tokens are a sequence of numbers and letters, e.g. </a:t>
+            </a:r>
+            <a:r>
+              <a:rPr>
+                <a:latin typeface="Courier"/>
+              </a:rPr>
+              <a:t>TFYhj6g1JtFiq3t5ytooCv333j2wliwMOB60iXaULajaQ01X71DDDDABOsIk</a:t>
+            </a:r>
+            <a:r>
+              <a:rPr/>
+              <a:t>) (Zotero Group URL e.g., https://www.zotero.org/groups/6217595)</a:t>
             </a:r>
           </a:p>
         </p:txBody>
@@ -5037,6 +5056,33 @@
  | sort\
  | preston cat\
  &gt; metadata-before-change.txt</a:t>
+            </a:r>
+          </a:p>
+          <a:p>
+            <a:pPr lvl="0" indent="0" marL="0">
+              <a:buNone/>
+            </a:pPr>
+            <a:r>
+              <a:rPr/>
+              <a:t>(replace </a:t>
+            </a:r>
+            <a:r>
+              <a:rPr>
+                <a:latin typeface="Courier"/>
+              </a:rPr>
+              <a:t>[Zotero group number]</a:t>
+            </a:r>
+            <a:r>
+              <a:rPr/>
+              <a:t> with the number found in URL, make sure to remove brackets, e.g., https://www.zotero.org/groups/</a:t>
+            </a:r>
+            <a:r>
+              <a:rPr b="1"/>
+              <a:t>6217595</a:t>
+            </a:r>
+            <a:r>
+              <a:rPr/>
+              <a:t>)</a:t>
             </a:r>
           </a:p>
         </p:txBody>

</xml_diff>

<commit_message>
update workshop materials as discussed with @ajacsherman
</commit_message>
<xml_diff>
--- a/workshop.pptx
+++ b/workshop.pptx
@@ -45,6 +45,10 @@
     <p:sldId id="293" r:id="rId39"/>
     <p:sldId id="294" r:id="rId40"/>
     <p:sldId id="295" r:id="rId41"/>
+    <p:sldId id="296" r:id="rId42"/>
+    <p:sldId id="297" r:id="rId43"/>
+    <p:sldId id="298" r:id="rId44"/>
+    <p:sldId id="299" r:id="rId45"/>
   </p:sldIdLst>
   <p:sldSz cx="9144000" cy="5143500" type="screen16x9"/>
   <p:notesSz cx="6858000" cy="9144000"/>
@@ -6871,6 +6875,444 @@
 </file>
 
 <file path=ppt/slides/slide40.xml><?xml version="1.0" encoding="utf-8"?>
+<p:sld xmlns:a="http://schemas.openxmlformats.org/drawingml/2006/main" xmlns:r="http://schemas.openxmlformats.org/officeDocument/2006/relationships" xmlns:p="http://schemas.openxmlformats.org/presentationml/2006/main">
+  <p:cSld>
+    <p:spTree>
+      <p:nvGrpSpPr>
+        <p:cNvPr id="1" name=""/>
+        <p:cNvGrpSpPr/>
+        <p:nvPr/>
+      </p:nvGrpSpPr>
+      <p:grpSpPr>
+        <a:xfrm>
+          <a:off x="0" y="0"/>
+          <a:ext cx="0" cy="0"/>
+          <a:chOff x="0" y="0"/>
+          <a:chExt cx="0" cy="0"/>
+        </a:xfrm>
+      </p:grpSpPr>
+      <p:sp>
+        <p:nvSpPr>
+          <p:cNvPr id="2" name="Title 1"/>
+          <p:cNvSpPr>
+            <a:spLocks noGrp="1"/>
+          </p:cNvSpPr>
+          <p:nvPr>
+            <p:ph type="title"/>
+          </p:nvPr>
+        </p:nvSpPr>
+        <p:spPr/>
+        <p:txBody>
+          <a:bodyPr/>
+          <a:lstStyle/>
+          <a:p>
+            <a:pPr lvl="0" indent="0" marL="0">
+              <a:buNone/>
+            </a:pPr>
+            <a:r>
+              <a:rPr/>
+              <a:t>Part V.1 - BatLit Release Introduction.</a:t>
+            </a:r>
+          </a:p>
+        </p:txBody>
+      </p:sp>
+      <p:sp>
+        <p:nvSpPr>
+          <p:cNvPr id="3" name="Content Placeholder 2"/>
+          <p:cNvSpPr>
+            <a:spLocks noGrp="1"/>
+          </p:cNvSpPr>
+          <p:nvPr>
+            <p:ph idx="1"/>
+          </p:nvPr>
+        </p:nvSpPr>
+        <p:spPr/>
+        <p:txBody>
+          <a:bodyPr/>
+          <a:lstStyle/>
+          <a:p>
+            <a:pPr lvl="0" indent="0" marL="0">
+              <a:buNone/>
+            </a:pPr>
+            <a:r>
+              <a:rPr/>
+              <a:t>Metadata for BatLit releases are in the data folder of https://github.com/bat-literature/bat-literature.github.io . A new release needs to be linked to the older releases to enable version tracking between versions. This is why we need to clone or update the github repository first before making a snapshot of the BatLit Zotero group. Then, after making the snapshot, we include the tracked metadata and commit this to the repository. Also, we keep a copy of the metadata + pdfs elsewhere. So, you need to backup the data folder including metadata and pdfs.</a:t>
+            </a:r>
+          </a:p>
+        </p:txBody>
+      </p:sp>
+    </p:spTree>
+  </p:cSld>
+</p:sld>
+</file>
+
+<file path=ppt/slides/slide41.xml><?xml version="1.0" encoding="utf-8"?>
+<p:sld xmlns:a="http://schemas.openxmlformats.org/drawingml/2006/main" xmlns:r="http://schemas.openxmlformats.org/officeDocument/2006/relationships" xmlns:p="http://schemas.openxmlformats.org/presentationml/2006/main">
+  <p:cSld>
+    <p:spTree>
+      <p:nvGrpSpPr>
+        <p:cNvPr id="1" name=""/>
+        <p:cNvGrpSpPr/>
+        <p:nvPr/>
+      </p:nvGrpSpPr>
+      <p:grpSpPr>
+        <a:xfrm>
+          <a:off x="0" y="0"/>
+          <a:ext cx="0" cy="0"/>
+          <a:chOff x="0" y="0"/>
+          <a:chExt cx="0" cy="0"/>
+        </a:xfrm>
+      </p:grpSpPr>
+      <p:sp>
+        <p:nvSpPr>
+          <p:cNvPr id="2" name="Title 1"/>
+          <p:cNvSpPr>
+            <a:spLocks noGrp="1"/>
+          </p:cNvSpPr>
+          <p:nvPr>
+            <p:ph type="title"/>
+          </p:nvPr>
+        </p:nvSpPr>
+        <p:spPr/>
+        <p:txBody>
+          <a:bodyPr/>
+          <a:lstStyle/>
+          <a:p>
+            <a:pPr lvl="0" indent="0" marL="0">
+              <a:buNone/>
+            </a:pPr>
+            <a:r>
+              <a:rPr/>
+              <a:t>Part V.2 - Clone/Update BatLit Repository</a:t>
+            </a:r>
+          </a:p>
+        </p:txBody>
+      </p:sp>
+      <p:sp>
+        <p:nvSpPr>
+          <p:cNvPr id="3" name="Content Placeholder 2"/>
+          <p:cNvSpPr>
+            <a:spLocks noGrp="1"/>
+          </p:cNvSpPr>
+          <p:nvPr>
+            <p:ph idx="1"/>
+          </p:nvPr>
+        </p:nvSpPr>
+        <p:spPr/>
+        <p:txBody>
+          <a:bodyPr/>
+          <a:lstStyle/>
+          <a:p>
+            <a:pPr lvl="0" indent="0" marL="0">
+              <a:buNone/>
+            </a:pPr>
+            <a:r>
+              <a:rPr/>
+              <a:t>Make sure to install </a:t>
+            </a:r>
+            <a:r>
+              <a:rPr>
+                <a:latin typeface="Courier"/>
+              </a:rPr>
+              <a:t>git</a:t>
+            </a:r>
+            <a:r>
+              <a:rPr/>
+              <a:t> on your system by running:</a:t>
+            </a:r>
+          </a:p>
+          <a:p>
+            <a:pPr lvl="0" indent="0">
+              <a:buNone/>
+            </a:pPr>
+            <a:r>
+              <a:rPr>
+                <a:latin typeface="Courier"/>
+              </a:rPr>
+              <a:t>sudo apt install git</a:t>
+            </a:r>
+          </a:p>
+          <a:p>
+            <a:pPr lvl="0" indent="0" marL="0">
+              <a:buNone/>
+            </a:pPr>
+            <a:r>
+              <a:rPr/>
+              <a:t>check whether git installed by</a:t>
+            </a:r>
+          </a:p>
+          <a:p>
+            <a:pPr lvl="0" indent="0">
+              <a:buNone/>
+            </a:pPr>
+            <a:r>
+              <a:rPr>
+                <a:latin typeface="Courier"/>
+              </a:rPr>
+              <a:t>git --version</a:t>
+            </a:r>
+          </a:p>
+          <a:p>
+            <a:pPr lvl="0" indent="0" marL="0">
+              <a:buNone/>
+            </a:pPr>
+            <a:r>
+              <a:rPr/>
+              <a:t>this should produce something like:</a:t>
+            </a:r>
+          </a:p>
+          <a:p>
+            <a:pPr lvl="0" indent="0">
+              <a:buNone/>
+            </a:pPr>
+            <a:r>
+              <a:rPr>
+                <a:latin typeface="Courier"/>
+              </a:rPr>
+              <a:t>git version 2.43.0</a:t>
+            </a:r>
+          </a:p>
+          <a:p>
+            <a:pPr lvl="0" indent="0" marL="0">
+              <a:buNone/>
+            </a:pPr>
+            <a:r>
+              <a:rPr/>
+              <a:t>then, run</a:t>
+            </a:r>
+          </a:p>
+          <a:p>
+            <a:pPr lvl="0" indent="0">
+              <a:buNone/>
+            </a:pPr>
+            <a:r>
+              <a:rPr>
+                <a:latin typeface="Courier"/>
+              </a:rPr>
+              <a:t>git clone https://github.com/bat-literature/bat-literature.github.io </a:t>
+            </a:r>
+          </a:p>
+          <a:p>
+            <a:pPr lvl="0" indent="0" marL="0">
+              <a:buNone/>
+            </a:pPr>
+            <a:r>
+              <a:rPr/>
+              <a:t>to “clone” (or create a copy of) the BatLit repository. By default, the repository is cloned into a folder with the same name as the repository (e.g., </a:t>
+            </a:r>
+            <a:r>
+              <a:rPr>
+                <a:latin typeface="Courier"/>
+              </a:rPr>
+              <a:t>bat-literature.github.io</a:t>
+            </a:r>
+            <a:r>
+              <a:rPr/>
+              <a:t>).</a:t>
+            </a:r>
+          </a:p>
+        </p:txBody>
+      </p:sp>
+    </p:spTree>
+  </p:cSld>
+</p:sld>
+</file>
+
+<file path=ppt/slides/slide42.xml><?xml version="1.0" encoding="utf-8"?>
+<p:sld xmlns:a="http://schemas.openxmlformats.org/drawingml/2006/main" xmlns:r="http://schemas.openxmlformats.org/officeDocument/2006/relationships" xmlns:p="http://schemas.openxmlformats.org/presentationml/2006/main">
+  <p:cSld>
+    <p:spTree>
+      <p:nvGrpSpPr>
+        <p:cNvPr id="1" name=""/>
+        <p:cNvGrpSpPr/>
+        <p:nvPr/>
+      </p:nvGrpSpPr>
+      <p:grpSpPr>
+        <a:xfrm>
+          <a:off x="0" y="0"/>
+          <a:ext cx="0" cy="0"/>
+          <a:chOff x="0" y="0"/>
+          <a:chExt cx="0" cy="0"/>
+        </a:xfrm>
+      </p:grpSpPr>
+      <p:sp>
+        <p:nvSpPr>
+          <p:cNvPr id="2" name="Title 1"/>
+          <p:cNvSpPr>
+            <a:spLocks noGrp="1"/>
+          </p:cNvSpPr>
+          <p:nvPr>
+            <p:ph type="title"/>
+          </p:nvPr>
+        </p:nvSpPr>
+        <p:spPr/>
+        <p:txBody>
+          <a:bodyPr/>
+          <a:lstStyle/>
+          <a:p>
+            <a:pPr lvl="0" indent="0" marL="0">
+              <a:buNone/>
+            </a:pPr>
+            <a:r>
+              <a:rPr/>
+              <a:t>Part V.2 - Verify Current BatLit Version</a:t>
+            </a:r>
+          </a:p>
+        </p:txBody>
+      </p:sp>
+      <p:sp>
+        <p:nvSpPr>
+          <p:cNvPr id="3" name="Content Placeholder 2"/>
+          <p:cNvSpPr>
+            <a:spLocks noGrp="1"/>
+          </p:cNvSpPr>
+          <p:nvPr>
+            <p:ph idx="1"/>
+          </p:nvPr>
+        </p:nvSpPr>
+        <p:spPr/>
+        <p:txBody>
+          <a:bodyPr/>
+          <a:lstStyle/>
+          <a:p>
+            <a:pPr lvl="0" indent="0" marL="0">
+              <a:buNone/>
+            </a:pPr>
+            <a:r>
+              <a:rPr/>
+              <a:t>Step 1. go into </a:t>
+            </a:r>
+            <a:r>
+              <a:rPr>
+                <a:latin typeface="Courier"/>
+              </a:rPr>
+              <a:t>bat-literature.github.io</a:t>
+            </a:r>
+            <a:r>
+              <a:rPr/>
+              <a:t> directory using </a:t>
+            </a:r>
+            <a:r>
+              <a:rPr>
+                <a:latin typeface="Courier"/>
+              </a:rPr>
+              <a:t>cd</a:t>
+            </a:r>
+            <a:r>
+              <a:rPr/>
+              <a:t> Step 2. run </a:t>
+            </a:r>
+            <a:r>
+              <a:rPr>
+                <a:latin typeface="Courier"/>
+              </a:rPr>
+              <a:t>preston head --algo md5</a:t>
+            </a:r>
+            <a:r>
+              <a:rPr/>
+              <a:t> Step 3. Compare the output of the command with the existing version on https://batlit.org/datapaper</a:t>
+            </a:r>
+          </a:p>
+        </p:txBody>
+      </p:sp>
+    </p:spTree>
+  </p:cSld>
+</p:sld>
+</file>
+
+<file path=ppt/slides/slide43.xml><?xml version="1.0" encoding="utf-8"?>
+<p:sld xmlns:a="http://schemas.openxmlformats.org/drawingml/2006/main" xmlns:r="http://schemas.openxmlformats.org/officeDocument/2006/relationships" xmlns:p="http://schemas.openxmlformats.org/presentationml/2006/main">
+  <p:cSld>
+    <p:spTree>
+      <p:nvGrpSpPr>
+        <p:cNvPr id="1" name=""/>
+        <p:cNvGrpSpPr/>
+        <p:nvPr/>
+      </p:nvGrpSpPr>
+      <p:grpSpPr>
+        <a:xfrm>
+          <a:off x="0" y="0"/>
+          <a:ext cx="0" cy="0"/>
+          <a:chOff x="0" y="0"/>
+          <a:chExt cx="0" cy="0"/>
+        </a:xfrm>
+      </p:grpSpPr>
+      <p:sp>
+        <p:nvSpPr>
+          <p:cNvPr id="2" name="Title 1"/>
+          <p:cNvSpPr>
+            <a:spLocks noGrp="1"/>
+          </p:cNvSpPr>
+          <p:nvPr>
+            <p:ph type="title"/>
+          </p:nvPr>
+        </p:nvSpPr>
+        <p:spPr/>
+        <p:txBody>
+          <a:bodyPr/>
+          <a:lstStyle/>
+          <a:p>
+            <a:pPr lvl="0" indent="0" marL="0">
+              <a:buNone/>
+            </a:pPr>
+            <a:r>
+              <a:rPr/>
+              <a:t>Part V.2 - Create a Zotero Snapshot</a:t>
+            </a:r>
+          </a:p>
+        </p:txBody>
+      </p:sp>
+      <p:sp>
+        <p:nvSpPr>
+          <p:cNvPr id="3" name="Content Placeholder 2"/>
+          <p:cNvSpPr>
+            <a:spLocks noGrp="1"/>
+          </p:cNvSpPr>
+          <p:nvPr>
+            <p:ph idx="1"/>
+          </p:nvPr>
+        </p:nvSpPr>
+        <p:spPr/>
+        <p:txBody>
+          <a:bodyPr/>
+          <a:lstStyle/>
+          <a:p>
+            <a:pPr lvl="0" indent="0" marL="0">
+              <a:buNone/>
+            </a:pPr>
+            <a:r>
+              <a:rPr/>
+              <a:t>Step 1. Set Zotero API Key with read-only access to the BatLit Zotero Step 2. Go into the </a:t>
+            </a:r>
+            <a:r>
+              <a:rPr>
+                <a:latin typeface="Courier"/>
+              </a:rPr>
+              <a:t>bat-literature.github.io</a:t>
+            </a:r>
+            <a:r>
+              <a:rPr/>
+              <a:t> directory Step 3. Verify that a preston history exists by running </a:t>
+            </a:r>
+            <a:r>
+              <a:rPr>
+                <a:latin typeface="Courier"/>
+              </a:rPr>
+              <a:t>preston history --algo md5</a:t>
+            </a:r>
+            <a:r>
+              <a:rPr/>
+              <a:t> Step 4. Create a snapshot of the BatLit Zotero group</a:t>
+            </a:r>
+          </a:p>
+        </p:txBody>
+      </p:sp>
+    </p:spTree>
+  </p:cSld>
+</p:sld>
+</file>
+
+<file path=ppt/slides/slide44.xml><?xml version="1.0" encoding="utf-8"?>
 <p:sld xmlns:a="http://schemas.openxmlformats.org/drawingml/2006/main" xmlns:r="http://schemas.openxmlformats.org/officeDocument/2006/relationships" xmlns:p="http://schemas.openxmlformats.org/presentationml/2006/main">
   <p:cSld>
     <p:spTree>

</xml_diff>

<commit_message>
update diagram in workshop slides
</commit_message>
<xml_diff>
--- a/workshop.pptx
+++ b/workshop.pptx
@@ -7465,8 +7465,8 @@
         </p:blipFill>
         <p:spPr bwMode="auto">
           <a:xfrm>
-            <a:off x="1651000" y="1193800"/>
-            <a:ext cx="5854700" cy="3390900"/>
+            <a:off x="2311400" y="1193800"/>
+            <a:ext cx="4533900" cy="3390900"/>
           </a:xfrm>
           <a:prstGeom prst="rect">
             <a:avLst/>

</xml_diff>

<commit_message>
update workshop material after knowledge transfer session with @ajacsherman
</commit_message>
<xml_diff>
--- a/workshop.pptx
+++ b/workshop.pptx
@@ -49,6 +49,9 @@
     <p:sldId id="297" r:id="rId43"/>
     <p:sldId id="298" r:id="rId44"/>
     <p:sldId id="299" r:id="rId45"/>
+    <p:sldId id="300" r:id="rId46"/>
+    <p:sldId id="301" r:id="rId47"/>
+    <p:sldId id="302" r:id="rId48"/>
   </p:sldIdLst>
   <p:sldSz cx="9144000" cy="5143500" type="screen16x9"/>
   <p:notesSz cx="6858000" cy="9144000"/>
@@ -7313,6 +7316,608 @@
 </file>
 
 <file path=ppt/slides/slide44.xml><?xml version="1.0" encoding="utf-8"?>
+<p:sld xmlns:a="http://schemas.openxmlformats.org/drawingml/2006/main" xmlns:r="http://schemas.openxmlformats.org/officeDocument/2006/relationships" xmlns:p="http://schemas.openxmlformats.org/presentationml/2006/main">
+  <p:cSld>
+    <p:spTree>
+      <p:nvGrpSpPr>
+        <p:cNvPr id="1" name=""/>
+        <p:cNvGrpSpPr/>
+        <p:nvPr/>
+      </p:nvGrpSpPr>
+      <p:grpSpPr>
+        <a:xfrm>
+          <a:off x="0" y="0"/>
+          <a:ext cx="0" cy="0"/>
+          <a:chOff x="0" y="0"/>
+          <a:chExt cx="0" cy="0"/>
+        </a:xfrm>
+      </p:grpSpPr>
+      <p:sp>
+        <p:nvSpPr>
+          <p:cNvPr id="2" name="Title 1"/>
+          <p:cNvSpPr>
+            <a:spLocks noGrp="1"/>
+          </p:cNvSpPr>
+          <p:nvPr>
+            <p:ph type="title"/>
+          </p:nvPr>
+        </p:nvSpPr>
+        <p:spPr/>
+        <p:txBody>
+          <a:bodyPr/>
+          <a:lstStyle/>
+          <a:p>
+            <a:pPr lvl="0" indent="0" marL="0">
+              <a:buNone/>
+            </a:pPr>
+            <a:r>
+              <a:rPr/>
+              <a:t>Part VI.1- Update the “HEAD” or most recent version</a:t>
+            </a:r>
+          </a:p>
+        </p:txBody>
+      </p:sp>
+      <p:sp>
+        <p:nvSpPr>
+          <p:cNvPr id="3" name="Content Placeholder 2"/>
+          <p:cNvSpPr>
+            <a:spLocks noGrp="1"/>
+          </p:cNvSpPr>
+          <p:nvPr>
+            <p:ph idx="1"/>
+          </p:nvPr>
+        </p:nvSpPr>
+        <p:spPr/>
+        <p:txBody>
+          <a:bodyPr/>
+          <a:lstStyle/>
+          <a:p>
+            <a:pPr lvl="0" indent="0" marL="0">
+              <a:buNone/>
+            </a:pPr>
+            <a:r>
+              <a:rPr/>
+              <a:t>Step 1. open a terminal Step 2. go into the </a:t>
+            </a:r>
+            <a:r>
+              <a:rPr>
+                <a:latin typeface="Courier"/>
+              </a:rPr>
+              <a:t>bat-literature.github.io</a:t>
+            </a:r>
+            <a:r>
+              <a:rPr/>
+              <a:t> directory Step 3. make sure that the </a:t>
+            </a:r>
+            <a:r>
+              <a:rPr>
+                <a:latin typeface="Courier"/>
+              </a:rPr>
+              <a:t>HEAD</a:t>
+            </a:r>
+            <a:r>
+              <a:rPr/>
+              <a:t> file contain the most recent hash of the BatLit version by running</a:t>
+            </a:r>
+          </a:p>
+          <a:p>
+            <a:pPr lvl="0" indent="0">
+              <a:buNone/>
+            </a:pPr>
+            <a:r>
+              <a:rPr>
+                <a:latin typeface="Courier"/>
+              </a:rPr>
+              <a:t>preston head --algo md5 &gt; HEAD</a:t>
+            </a:r>
+          </a:p>
+          <a:p>
+            <a:pPr lvl="0" indent="0" marL="0">
+              <a:buNone/>
+            </a:pPr>
+            <a:r>
+              <a:rPr/>
+              <a:t>and verifying that the first hash is the same as the one in the </a:t>
+            </a:r>
+            <a:r>
+              <a:rPr>
+                <a:latin typeface="Courier"/>
+              </a:rPr>
+              <a:t>HEAD</a:t>
+            </a:r>
+            <a:r>
+              <a:rPr/>
+              <a:t> file by running</a:t>
+            </a:r>
+          </a:p>
+          <a:p>
+            <a:pPr lvl="0" indent="0">
+              <a:buNone/>
+            </a:pPr>
+            <a:r>
+              <a:rPr>
+                <a:latin typeface="Courier"/>
+              </a:rPr>
+              <a:t>cat HEAD</a:t>
+            </a:r>
+          </a:p>
+        </p:txBody>
+      </p:sp>
+    </p:spTree>
+  </p:cSld>
+</p:sld>
+</file>
+
+<file path=ppt/slides/slide45.xml><?xml version="1.0" encoding="utf-8"?>
+<p:sld xmlns:a="http://schemas.openxmlformats.org/drawingml/2006/main" xmlns:r="http://schemas.openxmlformats.org/officeDocument/2006/relationships" xmlns:p="http://schemas.openxmlformats.org/presentationml/2006/main">
+  <p:cSld>
+    <p:spTree>
+      <p:nvGrpSpPr>
+        <p:cNvPr id="1" name=""/>
+        <p:cNvGrpSpPr/>
+        <p:nvPr/>
+      </p:nvGrpSpPr>
+      <p:grpSpPr>
+        <a:xfrm>
+          <a:off x="0" y="0"/>
+          <a:ext cx="0" cy="0"/>
+          <a:chOff x="0" y="0"/>
+          <a:chExt cx="0" cy="0"/>
+        </a:xfrm>
+      </p:grpSpPr>
+      <p:sp>
+        <p:nvSpPr>
+          <p:cNvPr id="2" name="Title 1"/>
+          <p:cNvSpPr>
+            <a:spLocks noGrp="1"/>
+          </p:cNvSpPr>
+          <p:nvPr>
+            <p:ph type="title"/>
+          </p:nvPr>
+        </p:nvSpPr>
+        <p:spPr/>
+        <p:txBody>
+          <a:bodyPr/>
+          <a:lstStyle/>
+          <a:p>
+            <a:pPr lvl="0" indent="0" marL="0">
+              <a:buNone/>
+            </a:pPr>
+            <a:r>
+              <a:rPr/>
+              <a:t>Part VI.2- Update the Reference Lists for Website/search</a:t>
+            </a:r>
+          </a:p>
+        </p:txBody>
+      </p:sp>
+      <p:sp>
+        <p:nvSpPr>
+          <p:cNvPr id="3" name="Content Placeholder 2"/>
+          <p:cNvSpPr>
+            <a:spLocks noGrp="1"/>
+          </p:cNvSpPr>
+          <p:nvPr>
+            <p:ph idx="1"/>
+          </p:nvPr>
+        </p:nvSpPr>
+        <p:spPr/>
+        <p:txBody>
+          <a:bodyPr/>
+          <a:lstStyle/>
+          <a:p>
+            <a:pPr lvl="0" indent="0" marL="0">
+              <a:buNone/>
+            </a:pPr>
+            <a:r>
+              <a:rPr/>
+              <a:t>Step 1. open a terminal Step 2. go into the </a:t>
+            </a:r>
+            <a:r>
+              <a:rPr>
+                <a:latin typeface="Courier"/>
+              </a:rPr>
+              <a:t>bat-literature.github.io</a:t>
+            </a:r>
+            <a:r>
+              <a:rPr/>
+              <a:t> directory Step 3. verify that the program “miller” is installed by running</a:t>
+            </a:r>
+          </a:p>
+          <a:p>
+            <a:pPr lvl="0" indent="0">
+              <a:buNone/>
+            </a:pPr>
+            <a:r>
+              <a:rPr>
+                <a:latin typeface="Courier"/>
+              </a:rPr>
+              <a:t>mlr --version</a:t>
+            </a:r>
+          </a:p>
+          <a:p>
+            <a:pPr lvl="0" indent="0" marL="0">
+              <a:buNone/>
+            </a:pPr>
+            <a:r>
+              <a:rPr/>
+              <a:t>If not install, run:</a:t>
+            </a:r>
+          </a:p>
+          <a:p>
+            <a:pPr lvl="0" indent="0">
+              <a:buNone/>
+            </a:pPr>
+            <a:r>
+              <a:rPr>
+                <a:latin typeface="Courier"/>
+              </a:rPr>
+              <a:t>sudo apt install miller</a:t>
+            </a:r>
+          </a:p>
+          <a:p>
+            <a:pPr lvl="0" indent="0" marL="0">
+              <a:buNone/>
+            </a:pPr>
+            <a:r>
+              <a:rPr/>
+              <a:t>Step 4. to generate a table of the most recent bat lit references, run the command:</a:t>
+            </a:r>
+          </a:p>
+          <a:p>
+            <a:pPr lvl="0" indent="0">
+              <a:buNone/>
+            </a:pPr>
+            <a:r>
+              <a:rPr>
+                <a:latin typeface="Courier"/>
+              </a:rPr>
+              <a:t>bin/list-refs.sh\
+ | tee zotero/refs.csv</a:t>
+            </a:r>
+          </a:p>
+          <a:p>
+            <a:pPr lvl="0" indent="0" marL="0">
+              <a:buNone/>
+            </a:pPr>
+            <a:r>
+              <a:rPr/>
+              <a:t>Step 4. inspect the file </a:t>
+            </a:r>
+            <a:r>
+              <a:rPr>
+                <a:latin typeface="Courier"/>
+              </a:rPr>
+              <a:t>zotero/refs.csv</a:t>
+            </a:r>
+          </a:p>
+          <a:p>
+            <a:pPr lvl="0" indent="0" marL="0">
+              <a:buNone/>
+            </a:pPr>
+            <a:r>
+              <a:rPr/>
+              <a:t>Step 5. Now, generate the files </a:t>
+            </a:r>
+            <a:r>
+              <a:rPr>
+                <a:latin typeface="Courier"/>
+              </a:rPr>
+              <a:t>zotero/refs.tsv</a:t>
+            </a:r>
+            <a:r>
+              <a:rPr/>
+              <a:t>, </a:t>
+            </a:r>
+            <a:r>
+              <a:rPr>
+                <a:latin typeface="Courier"/>
+              </a:rPr>
+              <a:t>zotero/refs-100.csv</a:t>
+            </a:r>
+            <a:r>
+              <a:rPr/>
+              <a:t> and </a:t>
+            </a:r>
+            <a:r>
+              <a:rPr>
+                <a:latin typeface="Courier"/>
+              </a:rPr>
+              <a:t>zotero/refs-100.tsv</a:t>
+            </a:r>
+          </a:p>
+          <a:p>
+            <a:pPr lvl="0" indent="0" marL="0">
+              <a:buNone/>
+            </a:pPr>
+            <a:r>
+              <a:rPr/>
+              <a:t>using </a:t>
+            </a:r>
+            <a:r>
+              <a:rPr>
+                <a:latin typeface="Courier"/>
+              </a:rPr>
+              <a:t>cat zotero/refs.csv\   | mlr --icsv --otsvlite cat\    &gt; zotero/refs.tsv</a:t>
+            </a:r>
+          </a:p>
+          <a:p>
+            <a:pPr lvl="0" indent="0">
+              <a:buNone/>
+            </a:pPr>
+            <a:r>
+              <a:rPr>
+                <a:latin typeface="Courier"/>
+              </a:rPr>
+              <a:t>cat zotero/refs.csv\
+ | head -n101\
+  &gt; zotero/refs-100.csv</a:t>
+            </a:r>
+          </a:p>
+          <a:p>
+            <a:pPr lvl="0" indent="0">
+              <a:buNone/>
+            </a:pPr>
+            <a:r>
+              <a:rPr>
+                <a:latin typeface="Courier"/>
+              </a:rPr>
+              <a:t> cat zotero/refs.csv\
+  | head -n101\
+   &gt; zotero/refs-100.csv</a:t>
+            </a:r>
+          </a:p>
+        </p:txBody>
+      </p:sp>
+    </p:spTree>
+  </p:cSld>
+</p:sld>
+</file>
+
+<file path=ppt/slides/slide46.xml><?xml version="1.0" encoding="utf-8"?>
+<p:sld xmlns:a="http://schemas.openxmlformats.org/drawingml/2006/main" xmlns:r="http://schemas.openxmlformats.org/officeDocument/2006/relationships" xmlns:p="http://schemas.openxmlformats.org/presentationml/2006/main">
+  <p:cSld>
+    <p:spTree>
+      <p:nvGrpSpPr>
+        <p:cNvPr id="1" name=""/>
+        <p:cNvGrpSpPr/>
+        <p:nvPr/>
+      </p:nvGrpSpPr>
+      <p:grpSpPr>
+        <a:xfrm>
+          <a:off x="0" y="0"/>
+          <a:ext cx="0" cy="0"/>
+          <a:chOff x="0" y="0"/>
+          <a:chExt cx="0" cy="0"/>
+        </a:xfrm>
+      </p:grpSpPr>
+      <p:sp>
+        <p:nvSpPr>
+          <p:cNvPr id="2" name="Title 1"/>
+          <p:cNvSpPr>
+            <a:spLocks noGrp="1"/>
+          </p:cNvSpPr>
+          <p:nvPr>
+            <p:ph type="title"/>
+          </p:nvPr>
+        </p:nvSpPr>
+        <p:spPr/>
+        <p:txBody>
+          <a:bodyPr/>
+          <a:lstStyle/>
+          <a:p>
+            <a:pPr lvl="0" indent="0" marL="0">
+              <a:buNone/>
+            </a:pPr>
+            <a:r>
+              <a:rPr/>
+              <a:t>Part VI.3- Link BatLit references to their Zenodo deposits</a:t>
+            </a:r>
+          </a:p>
+        </p:txBody>
+      </p:sp>
+      <p:sp>
+        <p:nvSpPr>
+          <p:cNvPr id="3" name="Content Placeholder 2"/>
+          <p:cNvSpPr>
+            <a:spLocks noGrp="1"/>
+          </p:cNvSpPr>
+          <p:nvPr>
+            <p:ph idx="1"/>
+          </p:nvPr>
+        </p:nvSpPr>
+        <p:spPr/>
+        <p:txBody>
+          <a:bodyPr/>
+          <a:lstStyle/>
+          <a:p>
+            <a:pPr lvl="0" indent="0" marL="0">
+              <a:buNone/>
+            </a:pPr>
+            <a:r>
+              <a:rPr/>
+              <a:t>Now that we’ve created a reference table for the versioned Zotero records in </a:t>
+            </a:r>
+            <a:r>
+              <a:rPr>
+                <a:latin typeface="Courier"/>
+              </a:rPr>
+              <a:t>zotero/refs.csv</a:t>
+            </a:r>
+            <a:r>
+              <a:rPr/>
+              <a:t>, we’d like to add the Zenodo deposits associated with the Zotero records.</a:t>
+            </a:r>
+          </a:p>
+          <a:p>
+            <a:pPr lvl="0" indent="0" marL="0">
+              <a:buNone/>
+            </a:pPr>
+            <a:r>
+              <a:rPr/>
+              <a:t>For instance, the Zotero record identified by </a:t>
+            </a:r>
+            <a:r>
+              <a:rPr>
+                <a:latin typeface="Courier"/>
+              </a:rPr>
+              <a:t>urn:lsid:zotero.org:groups:5435545:items:NBLJKXN9</a:t>
+            </a:r>
+            <a:r>
+              <a:rPr/>
+              <a:t> is associated a reference with title “Lagos Bat Virus, an Under-Reported Rabies-Related Lyssavirus”. This reference is included in some specific row in the file </a:t>
+            </a:r>
+            <a:r>
+              <a:rPr>
+                <a:latin typeface="Courier"/>
+              </a:rPr>
+              <a:t>zotero/refs.csv</a:t>
+            </a:r>
+            <a:r>
+              <a:rPr/>
+              <a:t>.</a:t>
+            </a:r>
+          </a:p>
+          <a:p>
+            <a:pPr lvl="0" indent="0" marL="0">
+              <a:buNone/>
+            </a:pPr>
+            <a:r>
+              <a:rPr/>
+              <a:t>Following, we’d like to link this Zotero records to their counterpart in Zenodo. We do this via the identifier </a:t>
+            </a:r>
+            <a:r>
+              <a:rPr>
+                <a:latin typeface="Courier"/>
+              </a:rPr>
+              <a:t>urn:lsid:zotero.org:groups:5435545:items:NBLJKXN9</a:t>
+            </a:r>
+            <a:r>
+              <a:rPr/>
+              <a:t> . This identifier is embedded in the Zenodo deposits, and can be used to locate them in Zenodo.</a:t>
+            </a:r>
+          </a:p>
+          <a:p>
+            <a:pPr lvl="0" indent="0" marL="0">
+              <a:buNone/>
+            </a:pPr>
+            <a:r>
+              <a:rPr/>
+              <a:t>Finding a record associated with </a:t>
+            </a:r>
+            <a:r>
+              <a:rPr>
+                <a:latin typeface="Courier"/>
+              </a:rPr>
+              <a:t>urn:lsid:zotero.org:groups:5435545:items:NBLJKXN9</a:t>
+            </a:r>
+            <a:r>
+              <a:rPr/>
+              <a:t> can be done using:</a:t>
+            </a:r>
+          </a:p>
+          <a:p>
+            <a:pPr lvl="0" indent="0" marL="0">
+              <a:buNone/>
+            </a:pPr>
+            <a:r>
+              <a:rPr/>
+              <a:t>https://zenodo.org/search?q=%22urn%3Alsid%3Azotero.org%3Agroups%3A5435545%3Aitems%3ANBLJKXN9%22</a:t>
+            </a:r>
+          </a:p>
+          <a:p>
+            <a:pPr lvl="0" indent="0" marL="0">
+              <a:buNone/>
+            </a:pPr>
+            <a:r>
+              <a:rPr/>
+              <a:t>which would generate some point-and-click result through a webpage.</a:t>
+            </a:r>
+          </a:p>
+          <a:p>
+            <a:pPr lvl="0" indent="0" marL="0">
+              <a:buNone/>
+            </a:pPr>
+            <a:r>
+              <a:rPr/>
+              <a:t>In order to make it easier to link straight from https://batlit.org to Zenodo, we have an automated workflow that programmatically queries Zenodo for the Zotero URNs in the BatLit reference list, and saves the result as a additional table column.</a:t>
+            </a:r>
+          </a:p>
+          <a:p>
+            <a:pPr lvl="0" indent="0" marL="0">
+              <a:buNone/>
+            </a:pPr>
+            <a:r>
+              <a:rPr/>
+              <a:t>First, we run the queries and save the results using:</a:t>
+            </a:r>
+          </a:p>
+          <a:p>
+            <a:pPr lvl="0" indent="0">
+              <a:buNone/>
+            </a:pPr>
+            <a:r>
+              <a:rPr>
+                <a:latin typeface="Courier"/>
+              </a:rPr>
+              <a:t>bin/track-zenodo-associations.sh</a:t>
+            </a:r>
+          </a:p>
+          <a:p>
+            <a:pPr lvl="0" indent="0" marL="0">
+              <a:buNone/>
+            </a:pPr>
+            <a:r>
+              <a:rPr/>
+              <a:t>(take a while, because it runs ~20k queries against the Zenodo API)</a:t>
+            </a:r>
+          </a:p>
+          <a:p>
+            <a:pPr lvl="0" indent="0" marL="0">
+              <a:buNone/>
+            </a:pPr>
+            <a:r>
+              <a:rPr/>
+              <a:t>then, after getting the results, we generate an enriched version of refs.csv using</a:t>
+            </a:r>
+          </a:p>
+          <a:p>
+            <a:pPr lvl="0" indent="0">
+              <a:buNone/>
+            </a:pPr>
+            <a:r>
+              <a:rPr>
+                <a:latin typeface="Courier"/>
+              </a:rPr>
+              <a:t>bin/refs2zenodo.sh\
+ &gt; zenodo/refs.csv</a:t>
+            </a:r>
+          </a:p>
+          <a:p>
+            <a:pPr lvl="0" indent="0" marL="0">
+              <a:buNone/>
+            </a:pPr>
+            <a:r>
+              <a:rPr/>
+              <a:t>This enriched version contains a Zenodo doi’s associated with Zotero records.</a:t>
+            </a:r>
+          </a:p>
+          <a:p>
+            <a:pPr lvl="0" indent="0" marL="0">
+              <a:buNone/>
+            </a:pPr>
+            <a:r>
+              <a:rPr/>
+              <a:t>Repeat steps from previous zotero/ refs files to generate tsv and summary versions.</a:t>
+            </a:r>
+          </a:p>
+        </p:txBody>
+      </p:sp>
+    </p:spTree>
+  </p:cSld>
+</p:sld>
+</file>
+
+<file path=ppt/slides/slide47.xml><?xml version="1.0" encoding="utf-8"?>
 <p:sld xmlns:a="http://schemas.openxmlformats.org/drawingml/2006/main" xmlns:r="http://schemas.openxmlformats.org/officeDocument/2006/relationships" xmlns:p="http://schemas.openxmlformats.org/presentationml/2006/main">
   <p:cSld>
     <p:spTree>

</xml_diff>

<commit_message>
add some more structure
</commit_message>
<xml_diff>
--- a/workshop.pptx
+++ b/workshop.pptx
@@ -3379,7 +3379,7 @@
             </a:pPr>
             <a:r>
               <a:rPr/>
-              <a:t>Part I.1 Say Hi and Version It</a:t>
+              <a:t>Part I.1 Say Hi and Version It - Step By Step</a:t>
             </a:r>
           </a:p>
         </p:txBody>
@@ -3462,7 +3462,7 @@
             </a:pPr>
             <a:r>
               <a:rPr/>
-              <a:t>Part I.2 Say Hi and Version It</a:t>
+              <a:t>Part I.2 Say Hi and Version It - Step By Step</a:t>
             </a:r>
           </a:p>
         </p:txBody>
@@ -3538,7 +3538,7 @@
             </a:r>
             <a:r>
               <a:rPr/>
-              <a:t> and records what content was recorded when and by who. This machine readable description is also known as the BOM Bill of Materials, manifest or packing slip for the tracked content.</a:t>
+              <a:t> and records what content was recorded when and by who. This machine readable description is also known as the Bill of Materials (BOM), manifest, or packing slip, for the tracked content.</a:t>
             </a:r>
           </a:p>
         </p:txBody>
@@ -3585,7 +3585,7 @@
             </a:pPr>
             <a:r>
               <a:rPr/>
-              <a:t>Part I.3 - Say Hi and Version It</a:t>
+              <a:t>Part I.3 - Say Hi and Version It - Step By Step</a:t>
             </a:r>
           </a:p>
         </p:txBody>
@@ -3679,7 +3679,7 @@
             </a:pPr>
             <a:r>
               <a:rPr/>
-              <a:t>Step I.4 - Say Hi and Version It</a:t>
+              <a:t>Step I.4 - Say Hi and Version It - Step By Step</a:t>
             </a:r>
           </a:p>
         </p:txBody>
@@ -3790,7 +3790,7 @@
             </a:pPr>
             <a:r>
               <a:rPr/>
-              <a:t>Part I.5 - Say Hi and Version It</a:t>
+              <a:t>Part I.5 - Say Hi and Version It - Step By Step</a:t>
             </a:r>
           </a:p>
         </p:txBody>
@@ -3893,7 +3893,7 @@
             </a:pPr>
             <a:r>
               <a:rPr/>
-              <a:t>Part I.6 - Say Hi and Version It</a:t>
+              <a:t>Part I.6 - Say Hi and Version It - Step By Step</a:t>
             </a:r>
           </a:p>
         </p:txBody>
@@ -4033,7 +4033,7 @@
             </a:pPr>
             <a:r>
               <a:rPr/>
-              <a:t>Part I.7 - Say Hi and Version It</a:t>
+              <a:t>Part I.7 - Say Hi and Version It - Step By Step</a:t>
             </a:r>
           </a:p>
         </p:txBody>
@@ -4264,7 +4264,7 @@
             </a:pPr>
             <a:r>
               <a:rPr/>
-              <a:t>Takeaways</a:t>
+              <a:t>Part I - Takeaways</a:t>
             </a:r>
           </a:p>
         </p:txBody>

</xml_diff>